<commit_message>
add some feature, I actually forgot what I've changed
</commit_message>
<xml_diff>
--- a/ppt/0422.pptx
+++ b/ppt/0422.pptx
@@ -5,7 +5,7 @@
     <p:sldMasterId id="2147483648" r:id="rId1"/>
   </p:sldMasterIdLst>
   <p:notesMasterIdLst>
-    <p:notesMasterId r:id="rId16"/>
+    <p:notesMasterId r:id="rId24"/>
   </p:notesMasterIdLst>
   <p:sldIdLst>
     <p:sldId id="256" r:id="rId2"/>
@@ -22,6 +22,14 @@
     <p:sldId id="300" r:id="rId13"/>
     <p:sldId id="301" r:id="rId14"/>
     <p:sldId id="302" r:id="rId15"/>
+    <p:sldId id="303" r:id="rId16"/>
+    <p:sldId id="304" r:id="rId17"/>
+    <p:sldId id="306" r:id="rId18"/>
+    <p:sldId id="305" r:id="rId19"/>
+    <p:sldId id="310" r:id="rId20"/>
+    <p:sldId id="307" r:id="rId21"/>
+    <p:sldId id="308" r:id="rId22"/>
+    <p:sldId id="309" r:id="rId23"/>
   </p:sldIdLst>
   <p:sldSz cx="12192000" cy="6858000"/>
   <p:notesSz cx="6858000" cy="9144000"/>
@@ -210,7 +218,7 @@
           <a:p>
             <a:fld id="{FEE5F619-DF5E-416B-B866-5F6697AABCEE}" type="datetimeFigureOut">
               <a:rPr lang="zh-TW" altLang="en-US" smtClean="0"/>
-              <a:t>2025/4/19</a:t>
+              <a:t>2025/4/21</a:t>
             </a:fld>
             <a:endParaRPr lang="zh-TW" altLang="en-US"/>
           </a:p>
@@ -624,7 +632,7 @@
           <a:p>
             <a:fld id="{B5CC9422-2511-4DEB-8886-B5AD4CD25B7D}" type="datetime1">
               <a:rPr lang="zh-TW" altLang="en-US" smtClean="0"/>
-              <a:t>2025/4/19</a:t>
+              <a:t>2025/4/21</a:t>
             </a:fld>
             <a:endParaRPr lang="zh-TW" altLang="en-US"/>
           </a:p>
@@ -822,7 +830,7 @@
           <a:p>
             <a:fld id="{B6DDFE32-2043-4B95-8CEA-949D1D532E89}" type="datetime1">
               <a:rPr lang="zh-TW" altLang="en-US" smtClean="0"/>
-              <a:t>2025/4/19</a:t>
+              <a:t>2025/4/21</a:t>
             </a:fld>
             <a:endParaRPr lang="zh-TW" altLang="en-US"/>
           </a:p>
@@ -1030,7 +1038,7 @@
           <a:p>
             <a:fld id="{207C0BCD-8E35-4E36-BA70-DF8CCEC4F900}" type="datetime1">
               <a:rPr lang="zh-TW" altLang="en-US" smtClean="0"/>
-              <a:t>2025/4/19</a:t>
+              <a:t>2025/4/21</a:t>
             </a:fld>
             <a:endParaRPr lang="zh-TW" altLang="en-US"/>
           </a:p>
@@ -1228,7 +1236,7 @@
           <a:p>
             <a:fld id="{D12744AA-2124-42E6-AA52-9077A6A76493}" type="datetime1">
               <a:rPr lang="zh-TW" altLang="en-US" smtClean="0"/>
-              <a:t>2025/4/19</a:t>
+              <a:t>2025/4/21</a:t>
             </a:fld>
             <a:endParaRPr lang="zh-TW" altLang="en-US"/>
           </a:p>
@@ -1503,7 +1511,7 @@
           <a:p>
             <a:fld id="{1E2A031D-4FFA-4B7E-B90B-3B0E99D95905}" type="datetime1">
               <a:rPr lang="zh-TW" altLang="en-US" smtClean="0"/>
-              <a:t>2025/4/19</a:t>
+              <a:t>2025/4/21</a:t>
             </a:fld>
             <a:endParaRPr lang="zh-TW" altLang="en-US"/>
           </a:p>
@@ -1768,7 +1776,7 @@
           <a:p>
             <a:fld id="{D963E789-9038-455D-87FB-B3612E9AC9A3}" type="datetime1">
               <a:rPr lang="zh-TW" altLang="en-US" smtClean="0"/>
-              <a:t>2025/4/19</a:t>
+              <a:t>2025/4/21</a:t>
             </a:fld>
             <a:endParaRPr lang="zh-TW" altLang="en-US"/>
           </a:p>
@@ -2180,7 +2188,7 @@
           <a:p>
             <a:fld id="{1AE525C3-42CF-4363-9956-46937FDA7220}" type="datetime1">
               <a:rPr lang="zh-TW" altLang="en-US" smtClean="0"/>
-              <a:t>2025/4/19</a:t>
+              <a:t>2025/4/21</a:t>
             </a:fld>
             <a:endParaRPr lang="zh-TW" altLang="en-US"/>
           </a:p>
@@ -2321,7 +2329,7 @@
           <a:p>
             <a:fld id="{4675F6D4-C983-4750-ACFD-FFD733A8AEBA}" type="datetime1">
               <a:rPr lang="zh-TW" altLang="en-US" smtClean="0"/>
-              <a:t>2025/4/19</a:t>
+              <a:t>2025/4/21</a:t>
             </a:fld>
             <a:endParaRPr lang="zh-TW" altLang="en-US"/>
           </a:p>
@@ -2434,7 +2442,7 @@
           <a:p>
             <a:fld id="{956BF6A0-178A-49B5-817C-3A928D943E2A}" type="datetime1">
               <a:rPr lang="zh-TW" altLang="en-US" smtClean="0"/>
-              <a:t>2025/4/19</a:t>
+              <a:t>2025/4/21</a:t>
             </a:fld>
             <a:endParaRPr lang="zh-TW" altLang="en-US"/>
           </a:p>
@@ -2745,7 +2753,7 @@
           <a:p>
             <a:fld id="{FFA7AC8A-5481-4A69-A182-F9F960B32A4D}" type="datetime1">
               <a:rPr lang="zh-TW" altLang="en-US" smtClean="0"/>
-              <a:t>2025/4/19</a:t>
+              <a:t>2025/4/21</a:t>
             </a:fld>
             <a:endParaRPr lang="zh-TW" altLang="en-US"/>
           </a:p>
@@ -3033,7 +3041,7 @@
           <a:p>
             <a:fld id="{FFD0E206-1C27-4E41-AC82-7A0AA2282A21}" type="datetime1">
               <a:rPr lang="zh-TW" altLang="en-US" smtClean="0"/>
-              <a:t>2025/4/19</a:t>
+              <a:t>2025/4/21</a:t>
             </a:fld>
             <a:endParaRPr lang="zh-TW" altLang="en-US"/>
           </a:p>
@@ -3274,7 +3282,7 @@
           <a:p>
             <a:fld id="{B73B85AF-FB41-4DE2-B200-20D62EB52EF6}" type="datetime1">
               <a:rPr lang="zh-TW" altLang="en-US" smtClean="0"/>
-              <a:t>2025/4/19</a:t>
+              <a:t>2025/4/21</a:t>
             </a:fld>
             <a:endParaRPr lang="zh-TW" altLang="en-US"/>
           </a:p>
@@ -3836,7 +3844,7 @@
                 <a:latin typeface="Times New Roman" panose="02020603050405020304" pitchFamily="18" charset="0"/>
                 <a:cs typeface="Times New Roman" panose="02020603050405020304" pitchFamily="18" charset="0"/>
               </a:rPr>
-              <a:t>2025/4/19</a:t>
+              <a:t>2025/4/21</a:t>
             </a:fld>
             <a:endParaRPr lang="zh-TW" altLang="en-US" sz="1600" dirty="0">
               <a:latin typeface="Times New Roman" panose="02020603050405020304" pitchFamily="18" charset="0"/>
@@ -3967,7 +3975,7 @@
           <a:p>
             <a:fld id="{D12744AA-2124-42E6-AA52-9077A6A76493}" type="datetime1">
               <a:rPr lang="zh-TW" altLang="en-US" smtClean="0"/>
-              <a:t>2025/4/20</a:t>
+              <a:t>2025/4/21</a:t>
             </a:fld>
             <a:endParaRPr lang="zh-TW" altLang="en-US"/>
           </a:p>
@@ -4002,8 +4010,8 @@
           </a:p>
         </p:txBody>
       </p:sp>
-      <mc:AlternateContent xmlns:mc="http://schemas.openxmlformats.org/markup-compatibility/2006">
-        <mc:Choice xmlns:a14="http://schemas.microsoft.com/office/drawing/2010/main" Requires="a14">
+      <mc:AlternateContent xmlns:mc="http://schemas.openxmlformats.org/markup-compatibility/2006" xmlns:a14="http://schemas.microsoft.com/office/drawing/2010/main">
+        <mc:Choice Requires="a14">
           <p:sp>
             <p:nvSpPr>
               <p:cNvPr id="10" name="內容版面配置區 2">
@@ -4100,7 +4108,7 @@
             </p:txBody>
           </p:sp>
         </mc:Choice>
-        <mc:Fallback>
+        <mc:Fallback xmlns="">
           <p:sp>
             <p:nvSpPr>
               <p:cNvPr id="10" name="內容版面配置區 2">
@@ -4144,8 +4152,8 @@
           </p:sp>
         </mc:Fallback>
       </mc:AlternateContent>
-      <mc:AlternateContent xmlns:mc="http://schemas.openxmlformats.org/markup-compatibility/2006">
-        <mc:Choice xmlns:a14="http://schemas.microsoft.com/office/drawing/2010/main" Requires="a14">
+      <mc:AlternateContent xmlns:mc="http://schemas.openxmlformats.org/markup-compatibility/2006" xmlns:a14="http://schemas.microsoft.com/office/drawing/2010/main">
+        <mc:Choice Requires="a14">
           <p:sp>
             <p:nvSpPr>
               <p:cNvPr id="3" name="文字方塊 2">
@@ -4174,6 +4182,7 @@
               </a:bodyPr>
               <a:lstStyle/>
               <a:p>
+                <a:pPr/>
                 <a14:m>
                   <m:oMathPara xmlns:m="http://schemas.openxmlformats.org/officeDocument/2006/math">
                     <m:oMathParaPr>
@@ -4295,7 +4304,7 @@
             </p:txBody>
           </p:sp>
         </mc:Choice>
-        <mc:Fallback>
+        <mc:Fallback xmlns="">
           <p:sp>
             <p:nvSpPr>
               <p:cNvPr id="3" name="文字方塊 2">
@@ -4657,8 +4666,8 @@
           </a:p>
         </p:txBody>
       </p:sp>
-      <mc:AlternateContent xmlns:mc="http://schemas.openxmlformats.org/markup-compatibility/2006">
-        <mc:Choice xmlns:a14="http://schemas.microsoft.com/office/drawing/2010/main" Requires="a14">
+      <mc:AlternateContent xmlns:mc="http://schemas.openxmlformats.org/markup-compatibility/2006" xmlns:a14="http://schemas.microsoft.com/office/drawing/2010/main">
+        <mc:Choice Requires="a14">
           <p:sp>
             <p:nvSpPr>
               <p:cNvPr id="10" name="內容版面配置區 2">
@@ -4761,7 +4770,7 @@
             </p:txBody>
           </p:sp>
         </mc:Choice>
-        <mc:Fallback>
+        <mc:Fallback xmlns="">
           <p:sp>
             <p:nvSpPr>
               <p:cNvPr id="10" name="內容版面配置區 2">
@@ -4805,8 +4814,8 @@
           </p:sp>
         </mc:Fallback>
       </mc:AlternateContent>
-      <mc:AlternateContent xmlns:mc="http://schemas.openxmlformats.org/markup-compatibility/2006">
-        <mc:Choice xmlns:a14="http://schemas.microsoft.com/office/drawing/2010/main" Requires="a14">
+      <mc:AlternateContent xmlns:mc="http://schemas.openxmlformats.org/markup-compatibility/2006" xmlns:a14="http://schemas.microsoft.com/office/drawing/2010/main">
+        <mc:Choice Requires="a14">
           <p:sp>
             <p:nvSpPr>
               <p:cNvPr id="12" name="文字方塊 11">
@@ -4835,6 +4844,7 @@
               </a:bodyPr>
               <a:lstStyle/>
               <a:p>
+                <a:pPr/>
                 <a14:m>
                   <m:oMathPara xmlns:m="http://schemas.openxmlformats.org/officeDocument/2006/math">
                     <m:oMathParaPr>
@@ -4991,7 +5001,7 @@
             </p:txBody>
           </p:sp>
         </mc:Choice>
-        <mc:Fallback>
+        <mc:Fallback xmlns="">
           <p:sp>
             <p:nvSpPr>
               <p:cNvPr id="12" name="文字方塊 11">
@@ -5036,8 +5046,8 @@
           </p:sp>
         </mc:Fallback>
       </mc:AlternateContent>
-      <mc:AlternateContent xmlns:mc="http://schemas.openxmlformats.org/markup-compatibility/2006">
-        <mc:Choice xmlns:a14="http://schemas.microsoft.com/office/drawing/2010/main" Requires="a14">
+      <mc:AlternateContent xmlns:mc="http://schemas.openxmlformats.org/markup-compatibility/2006" xmlns:a14="http://schemas.microsoft.com/office/drawing/2010/main">
+        <mc:Choice Requires="a14">
           <p:sp>
             <p:nvSpPr>
               <p:cNvPr id="7" name="文字方塊 6">
@@ -5066,6 +5076,7 @@
               </a:bodyPr>
               <a:lstStyle/>
               <a:p>
+                <a:pPr/>
                 <a14:m>
                   <m:oMathPara xmlns:m="http://schemas.openxmlformats.org/officeDocument/2006/math">
                     <m:oMathParaPr>
@@ -5244,7 +5255,7 @@
             </p:txBody>
           </p:sp>
         </mc:Choice>
-        <mc:Fallback>
+        <mc:Fallback xmlns="">
           <p:sp>
             <p:nvSpPr>
               <p:cNvPr id="7" name="文字方塊 6">
@@ -5289,8 +5300,8 @@
           </p:sp>
         </mc:Fallback>
       </mc:AlternateContent>
-      <mc:AlternateContent xmlns:mc="http://schemas.openxmlformats.org/markup-compatibility/2006">
-        <mc:Choice xmlns:a14="http://schemas.microsoft.com/office/drawing/2010/main" Requires="a14">
+      <mc:AlternateContent xmlns:mc="http://schemas.openxmlformats.org/markup-compatibility/2006" xmlns:a14="http://schemas.microsoft.com/office/drawing/2010/main">
+        <mc:Choice Requires="a14">
           <p:sp>
             <p:nvSpPr>
               <p:cNvPr id="8" name="文字方塊 7">
@@ -5319,6 +5330,7 @@
               </a:bodyPr>
               <a:lstStyle/>
               <a:p>
+                <a:pPr/>
                 <a14:m>
                   <m:oMathPara xmlns:m="http://schemas.openxmlformats.org/officeDocument/2006/math">
                     <m:oMathParaPr>
@@ -5481,7 +5493,7 @@
             </p:txBody>
           </p:sp>
         </mc:Choice>
-        <mc:Fallback>
+        <mc:Fallback xmlns="">
           <p:sp>
             <p:nvSpPr>
               <p:cNvPr id="8" name="文字方塊 7">
@@ -5526,8 +5538,8 @@
           </p:sp>
         </mc:Fallback>
       </mc:AlternateContent>
-      <mc:AlternateContent xmlns:mc="http://schemas.openxmlformats.org/markup-compatibility/2006">
-        <mc:Choice xmlns:a14="http://schemas.microsoft.com/office/drawing/2010/main" Requires="a14">
+      <mc:AlternateContent xmlns:mc="http://schemas.openxmlformats.org/markup-compatibility/2006" xmlns:a14="http://schemas.microsoft.com/office/drawing/2010/main">
+        <mc:Choice Requires="a14">
           <p:sp>
             <p:nvSpPr>
               <p:cNvPr id="9" name="文字方塊 8">
@@ -5556,6 +5568,7 @@
               </a:bodyPr>
               <a:lstStyle/>
               <a:p>
+                <a:pPr/>
                 <a14:m>
                   <m:oMathPara xmlns:m="http://schemas.openxmlformats.org/officeDocument/2006/math">
                     <m:oMathParaPr>
@@ -5710,7 +5723,7 @@
             </p:txBody>
           </p:sp>
         </mc:Choice>
-        <mc:Fallback>
+        <mc:Fallback xmlns="">
           <p:sp>
             <p:nvSpPr>
               <p:cNvPr id="9" name="文字方塊 8">
@@ -5755,8 +5768,8 @@
           </p:sp>
         </mc:Fallback>
       </mc:AlternateContent>
-      <mc:AlternateContent xmlns:mc="http://schemas.openxmlformats.org/markup-compatibility/2006">
-        <mc:Choice xmlns:a14="http://schemas.microsoft.com/office/drawing/2010/main" Requires="a14">
+      <mc:AlternateContent xmlns:mc="http://schemas.openxmlformats.org/markup-compatibility/2006" xmlns:a14="http://schemas.microsoft.com/office/drawing/2010/main">
+        <mc:Choice Requires="a14">
           <p:sp>
             <p:nvSpPr>
               <p:cNvPr id="15" name="文字方塊 14">
@@ -5785,6 +5798,7 @@
               </a:bodyPr>
               <a:lstStyle/>
               <a:p>
+                <a:pPr/>
                 <a14:m>
                   <m:oMathPara xmlns:m="http://schemas.openxmlformats.org/officeDocument/2006/math">
                     <m:oMathParaPr>
@@ -5982,7 +5996,7 @@
             </p:txBody>
           </p:sp>
         </mc:Choice>
-        <mc:Fallback>
+        <mc:Fallback xmlns="">
           <p:sp>
             <p:nvSpPr>
               <p:cNvPr id="15" name="文字方塊 14">
@@ -6144,8 +6158,8 @@
           </a:p>
         </p:txBody>
       </p:sp>
-      <mc:AlternateContent xmlns:mc="http://schemas.openxmlformats.org/markup-compatibility/2006">
-        <mc:Choice xmlns:a14="http://schemas.microsoft.com/office/drawing/2010/main" Requires="a14">
+      <mc:AlternateContent xmlns:mc="http://schemas.openxmlformats.org/markup-compatibility/2006" xmlns:a14="http://schemas.microsoft.com/office/drawing/2010/main">
+        <mc:Choice Requires="a14">
           <p:sp>
             <p:nvSpPr>
               <p:cNvPr id="10" name="內容版面配置區 2">
@@ -6230,7 +6244,7 @@
             </p:txBody>
           </p:sp>
         </mc:Choice>
-        <mc:Fallback>
+        <mc:Fallback xmlns="">
           <p:sp>
             <p:nvSpPr>
               <p:cNvPr id="10" name="內容版面配置區 2">
@@ -6274,8 +6288,8 @@
           </p:sp>
         </mc:Fallback>
       </mc:AlternateContent>
-      <mc:AlternateContent xmlns:mc="http://schemas.openxmlformats.org/markup-compatibility/2006">
-        <mc:Choice xmlns:a14="http://schemas.microsoft.com/office/drawing/2010/main" Requires="a14">
+      <mc:AlternateContent xmlns:mc="http://schemas.openxmlformats.org/markup-compatibility/2006" xmlns:a14="http://schemas.microsoft.com/office/drawing/2010/main">
+        <mc:Choice Requires="a14">
           <p:sp>
             <p:nvSpPr>
               <p:cNvPr id="13" name="文字方塊 12">
@@ -6304,6 +6318,7 @@
               </a:bodyPr>
               <a:lstStyle/>
               <a:p>
+                <a:pPr/>
                 <a14:m>
                   <m:oMathPara xmlns:m="http://schemas.openxmlformats.org/officeDocument/2006/math">
                     <m:oMathParaPr>
@@ -6542,7 +6557,7 @@
             </p:txBody>
           </p:sp>
         </mc:Choice>
-        <mc:Fallback>
+        <mc:Fallback xmlns="">
           <p:sp>
             <p:nvSpPr>
               <p:cNvPr id="13" name="文字方塊 12">
@@ -6587,8 +6602,8 @@
           </p:sp>
         </mc:Fallback>
       </mc:AlternateContent>
-      <mc:AlternateContent xmlns:mc="http://schemas.openxmlformats.org/markup-compatibility/2006">
-        <mc:Choice xmlns:a14="http://schemas.microsoft.com/office/drawing/2010/main" Requires="a14">
+      <mc:AlternateContent xmlns:mc="http://schemas.openxmlformats.org/markup-compatibility/2006" xmlns:a14="http://schemas.microsoft.com/office/drawing/2010/main">
+        <mc:Choice Requires="a14">
           <p:sp>
             <p:nvSpPr>
               <p:cNvPr id="14" name="文字方塊 13">
@@ -6927,7 +6942,7 @@
             </p:txBody>
           </p:sp>
         </mc:Choice>
-        <mc:Fallback>
+        <mc:Fallback xmlns="">
           <p:sp>
             <p:nvSpPr>
               <p:cNvPr id="14" name="文字方塊 13">
@@ -7379,7 +7394,7 @@
             <p:spPr>
               <a:xfrm>
                 <a:off x="1585589" y="5586949"/>
-                <a:ext cx="3176319" cy="397866"/>
+                <a:ext cx="3318216" cy="397866"/>
               </a:xfrm>
               <a:prstGeom prst="rect">
                 <a:avLst/>
@@ -7392,21 +7407,47 @@
               </a:bodyPr>
               <a:lstStyle/>
               <a:p>
+                <a:pPr/>
                 <a14:m>
                   <m:oMathPara xmlns:m="http://schemas.openxmlformats.org/officeDocument/2006/math">
                     <m:oMathParaPr>
                       <m:jc m:val="centerGroup"/>
                     </m:oMathParaPr>
                     <m:oMath xmlns:m="http://schemas.openxmlformats.org/officeDocument/2006/math">
-                      <m:r>
-                        <a:rPr lang="en-US" altLang="zh-TW" sz="2400" b="0" i="1" smtClean="0">
-                          <a:solidFill>
-                            <a:srgbClr val="00B0F0"/>
-                          </a:solidFill>
-                          <a:latin typeface="Cambria Math" panose="02040503050406030204" pitchFamily="18" charset="0"/>
-                        </a:rPr>
-                        <m:t>𝑥</m:t>
-                      </m:r>
+                      <m:sSub>
+                        <m:sSubPr>
+                          <m:ctrlPr>
+                            <a:rPr lang="en-US" altLang="zh-TW" sz="2400" b="0" i="1" smtClean="0">
+                              <a:solidFill>
+                                <a:srgbClr val="00B0F0"/>
+                              </a:solidFill>
+                              <a:latin typeface="Cambria Math" panose="02040503050406030204" pitchFamily="18" charset="0"/>
+                            </a:rPr>
+                          </m:ctrlPr>
+                        </m:sSubPr>
+                        <m:e>
+                          <m:r>
+                            <a:rPr lang="en-US" altLang="zh-TW" sz="2400" b="0" i="1" smtClean="0">
+                              <a:solidFill>
+                                <a:srgbClr val="00B0F0"/>
+                              </a:solidFill>
+                              <a:latin typeface="Cambria Math" panose="02040503050406030204" pitchFamily="18" charset="0"/>
+                            </a:rPr>
+                            <m:t>𝑥</m:t>
+                          </m:r>
+                        </m:e>
+                        <m:sub>
+                          <m:r>
+                            <a:rPr lang="en-US" altLang="zh-TW" sz="2400" b="0" i="1" smtClean="0">
+                              <a:solidFill>
+                                <a:srgbClr val="00B0F0"/>
+                              </a:solidFill>
+                              <a:latin typeface="Cambria Math" panose="02040503050406030204" pitchFamily="18" charset="0"/>
+                            </a:rPr>
+                            <m:t>𝑞</m:t>
+                          </m:r>
+                        </m:sub>
+                      </m:sSub>
                       <m:sSub>
                         <m:sSubPr>
                           <m:ctrlPr>
@@ -7630,7 +7671,7 @@
             <p:spPr>
               <a:xfrm>
                 <a:off x="1585589" y="5586949"/>
-                <a:ext cx="3176319" cy="397866"/>
+                <a:ext cx="3318216" cy="397866"/>
               </a:xfrm>
               <a:prstGeom prst="rect">
                 <a:avLst/>
@@ -7638,7 +7679,7 @@
               <a:blipFill>
                 <a:blip r:embed="rId3"/>
                 <a:stretch>
-                  <a:fillRect l="-768" r="-576" b="-24242"/>
+                  <a:fillRect l="-735" r="-551" b="-24242"/>
                 </a:stretch>
               </a:blipFill>
             </p:spPr>
@@ -7726,7 +7767,7 @@
             <p:spPr>
               <a:xfrm>
                 <a:off x="6484617" y="1645230"/>
-                <a:ext cx="4138377" cy="397866"/>
+                <a:ext cx="4426596" cy="397866"/>
               </a:xfrm>
               <a:prstGeom prst="rect">
                 <a:avLst/>
@@ -7739,21 +7780,47 @@
               </a:bodyPr>
               <a:lstStyle/>
               <a:p>
+                <a:pPr/>
                 <a14:m>
                   <m:oMathPara xmlns:m="http://schemas.openxmlformats.org/officeDocument/2006/math">
                     <m:oMathParaPr>
                       <m:jc m:val="centerGroup"/>
                     </m:oMathParaPr>
                     <m:oMath xmlns:m="http://schemas.openxmlformats.org/officeDocument/2006/math">
-                      <m:r>
-                        <a:rPr lang="en-US" altLang="zh-TW" sz="2400" b="0" i="1" smtClean="0">
-                          <a:solidFill>
-                            <a:srgbClr val="FF0000"/>
-                          </a:solidFill>
-                          <a:latin typeface="Cambria Math" panose="02040503050406030204" pitchFamily="18" charset="0"/>
-                        </a:rPr>
-                        <m:t>𝑥</m:t>
-                      </m:r>
+                      <m:sSub>
+                        <m:sSubPr>
+                          <m:ctrlPr>
+                            <a:rPr lang="en-US" altLang="zh-TW" sz="2400" b="0" i="1" smtClean="0">
+                              <a:solidFill>
+                                <a:srgbClr val="FF0000"/>
+                              </a:solidFill>
+                              <a:latin typeface="Cambria Math" panose="02040503050406030204" pitchFamily="18" charset="0"/>
+                            </a:rPr>
+                          </m:ctrlPr>
+                        </m:sSubPr>
+                        <m:e>
+                          <m:r>
+                            <a:rPr lang="en-US" altLang="zh-TW" sz="2400" b="0" i="1" smtClean="0">
+                              <a:solidFill>
+                                <a:srgbClr val="FF0000"/>
+                              </a:solidFill>
+                              <a:latin typeface="Cambria Math" panose="02040503050406030204" pitchFamily="18" charset="0"/>
+                            </a:rPr>
+                            <m:t>𝑥</m:t>
+                          </m:r>
+                        </m:e>
+                        <m:sub>
+                          <m:r>
+                            <a:rPr lang="en-US" altLang="zh-TW" sz="2400" b="0" i="1" smtClean="0">
+                              <a:solidFill>
+                                <a:srgbClr val="FF0000"/>
+                              </a:solidFill>
+                              <a:latin typeface="Cambria Math" panose="02040503050406030204" pitchFamily="18" charset="0"/>
+                            </a:rPr>
+                            <m:t>𝑞</m:t>
+                          </m:r>
+                        </m:sub>
+                      </m:sSub>
                       <m:sSub>
                         <m:sSubPr>
                           <m:ctrlPr>
@@ -8022,7 +8089,7 @@
             <p:spPr>
               <a:xfrm>
                 <a:off x="6484617" y="1645230"/>
-                <a:ext cx="4138377" cy="397866"/>
+                <a:ext cx="4426596" cy="397866"/>
               </a:xfrm>
               <a:prstGeom prst="rect">
                 <a:avLst/>
@@ -8030,7 +8097,7 @@
               <a:blipFill>
                 <a:blip r:embed="rId4"/>
                 <a:stretch>
-                  <a:fillRect l="-589" r="-2062" b="-26154"/>
+                  <a:fillRect r="-275" b="-26154"/>
                 </a:stretch>
               </a:blipFill>
             </p:spPr>
@@ -8062,6 +8129,970 @@
 </p:sld>
 </file>
 
+<file path=ppt/slides/slide15.xml><?xml version="1.0" encoding="utf-8"?>
+<p:sld xmlns:a="http://schemas.openxmlformats.org/drawingml/2006/main" xmlns:r="http://schemas.openxmlformats.org/officeDocument/2006/relationships" xmlns:p="http://schemas.openxmlformats.org/presentationml/2006/main">
+  <p:cSld>
+    <p:spTree>
+      <p:nvGrpSpPr>
+        <p:cNvPr id="1" name=""/>
+        <p:cNvGrpSpPr/>
+        <p:nvPr/>
+      </p:nvGrpSpPr>
+      <p:grpSpPr>
+        <a:xfrm>
+          <a:off x="0" y="0"/>
+          <a:ext cx="0" cy="0"/>
+          <a:chOff x="0" y="0"/>
+          <a:chExt cx="0" cy="0"/>
+        </a:xfrm>
+      </p:grpSpPr>
+      <p:sp>
+        <p:nvSpPr>
+          <p:cNvPr id="2" name="標題 1">
+            <a:extLst>
+              <a:ext uri="{FF2B5EF4-FFF2-40B4-BE49-F238E27FC236}">
+                <a16:creationId xmlns:a16="http://schemas.microsoft.com/office/drawing/2014/main" id="{3AAFAAE1-BAE4-4855-95BE-8CC6A9F33C0B}"/>
+              </a:ext>
+            </a:extLst>
+          </p:cNvPr>
+          <p:cNvSpPr>
+            <a:spLocks noGrp="1"/>
+          </p:cNvSpPr>
+          <p:nvPr>
+            <p:ph type="title"/>
+          </p:nvPr>
+        </p:nvSpPr>
+        <p:spPr/>
+        <p:txBody>
+          <a:bodyPr/>
+          <a:lstStyle/>
+          <a:p>
+            <a:r>
+              <a:rPr lang="en-US" altLang="zh-TW" dirty="0"/>
+              <a:t>Python Code</a:t>
+            </a:r>
+            <a:endParaRPr lang="zh-TW" altLang="en-US" dirty="0"/>
+          </a:p>
+        </p:txBody>
+      </p:sp>
+      <p:sp>
+        <p:nvSpPr>
+          <p:cNvPr id="4" name="日期版面配置區 3">
+            <a:extLst>
+              <a:ext uri="{FF2B5EF4-FFF2-40B4-BE49-F238E27FC236}">
+                <a16:creationId xmlns:a16="http://schemas.microsoft.com/office/drawing/2014/main" id="{9106CD2E-186F-4469-BA01-0D04FFED9E32}"/>
+              </a:ext>
+            </a:extLst>
+          </p:cNvPr>
+          <p:cNvSpPr>
+            <a:spLocks noGrp="1"/>
+          </p:cNvSpPr>
+          <p:nvPr>
+            <p:ph type="dt" sz="half" idx="10"/>
+          </p:nvPr>
+        </p:nvSpPr>
+        <p:spPr/>
+        <p:txBody>
+          <a:bodyPr/>
+          <a:lstStyle/>
+          <a:p>
+            <a:fld id="{D12744AA-2124-42E6-AA52-9077A6A76493}" type="datetime1">
+              <a:rPr lang="zh-TW" altLang="en-US" smtClean="0"/>
+              <a:t>2025/4/21</a:t>
+            </a:fld>
+            <a:endParaRPr lang="zh-TW" altLang="en-US"/>
+          </a:p>
+        </p:txBody>
+      </p:sp>
+      <p:sp>
+        <p:nvSpPr>
+          <p:cNvPr id="5" name="投影片編號版面配置區 4">
+            <a:extLst>
+              <a:ext uri="{FF2B5EF4-FFF2-40B4-BE49-F238E27FC236}">
+                <a16:creationId xmlns:a16="http://schemas.microsoft.com/office/drawing/2014/main" id="{10CD63D3-8EE8-456A-AD7C-5D5832D7514D}"/>
+              </a:ext>
+            </a:extLst>
+          </p:cNvPr>
+          <p:cNvSpPr>
+            <a:spLocks noGrp="1"/>
+          </p:cNvSpPr>
+          <p:nvPr>
+            <p:ph type="sldNum" sz="quarter" idx="12"/>
+          </p:nvPr>
+        </p:nvSpPr>
+        <p:spPr/>
+        <p:txBody>
+          <a:bodyPr/>
+          <a:lstStyle/>
+          <a:p>
+            <a:fld id="{13D67497-B2F6-4681-B86D-28F94DA14DA8}" type="slidenum">
+              <a:rPr lang="zh-TW" altLang="en-US" smtClean="0"/>
+              <a:t>15</a:t>
+            </a:fld>
+            <a:endParaRPr lang="zh-TW" altLang="en-US"/>
+          </a:p>
+        </p:txBody>
+      </p:sp>
+      <p:pic>
+        <p:nvPicPr>
+          <p:cNvPr id="10" name="圖片 9">
+            <a:extLst>
+              <a:ext uri="{FF2B5EF4-FFF2-40B4-BE49-F238E27FC236}">
+                <a16:creationId xmlns:a16="http://schemas.microsoft.com/office/drawing/2014/main" id="{9007B367-B6B2-41E5-8A1C-AD08F4B16C6B}"/>
+              </a:ext>
+            </a:extLst>
+          </p:cNvPr>
+          <p:cNvPicPr>
+            <a:picLocks noChangeAspect="1"/>
+          </p:cNvPicPr>
+          <p:nvPr/>
+        </p:nvPicPr>
+        <p:blipFill>
+          <a:blip r:embed="rId2"/>
+          <a:stretch>
+            <a:fillRect/>
+          </a:stretch>
+        </p:blipFill>
+        <p:spPr>
+          <a:xfrm>
+            <a:off x="752364" y="1756280"/>
+            <a:ext cx="5795722" cy="4279374"/>
+          </a:xfrm>
+          <a:prstGeom prst="rect">
+            <a:avLst/>
+          </a:prstGeom>
+        </p:spPr>
+      </p:pic>
+      <p:pic>
+        <p:nvPicPr>
+          <p:cNvPr id="13" name="圖片 12">
+            <a:extLst>
+              <a:ext uri="{FF2B5EF4-FFF2-40B4-BE49-F238E27FC236}">
+                <a16:creationId xmlns:a16="http://schemas.microsoft.com/office/drawing/2014/main" id="{70029499-D093-4D4B-A593-B20DC1F7276D}"/>
+              </a:ext>
+            </a:extLst>
+          </p:cNvPr>
+          <p:cNvPicPr>
+            <a:picLocks noChangeAspect="1"/>
+          </p:cNvPicPr>
+          <p:nvPr/>
+        </p:nvPicPr>
+        <p:blipFill>
+          <a:blip r:embed="rId3"/>
+          <a:stretch>
+            <a:fillRect/>
+          </a:stretch>
+        </p:blipFill>
+        <p:spPr>
+          <a:xfrm>
+            <a:off x="7237738" y="1756280"/>
+            <a:ext cx="3269483" cy="2874555"/>
+          </a:xfrm>
+          <a:prstGeom prst="rect">
+            <a:avLst/>
+          </a:prstGeom>
+        </p:spPr>
+      </p:pic>
+    </p:spTree>
+    <p:extLst>
+      <p:ext uri="{BB962C8B-B14F-4D97-AF65-F5344CB8AC3E}">
+        <p14:creationId xmlns:p14="http://schemas.microsoft.com/office/powerpoint/2010/main" val="95906963"/>
+      </p:ext>
+    </p:extLst>
+  </p:cSld>
+  <p:clrMapOvr>
+    <a:masterClrMapping/>
+  </p:clrMapOvr>
+</p:sld>
+</file>
+
+<file path=ppt/slides/slide16.xml><?xml version="1.0" encoding="utf-8"?>
+<p:sld xmlns:a="http://schemas.openxmlformats.org/drawingml/2006/main" xmlns:r="http://schemas.openxmlformats.org/officeDocument/2006/relationships" xmlns:p="http://schemas.openxmlformats.org/presentationml/2006/main">
+  <p:cSld>
+    <p:spTree>
+      <p:nvGrpSpPr>
+        <p:cNvPr id="1" name=""/>
+        <p:cNvGrpSpPr/>
+        <p:nvPr/>
+      </p:nvGrpSpPr>
+      <p:grpSpPr>
+        <a:xfrm>
+          <a:off x="0" y="0"/>
+          <a:ext cx="0" cy="0"/>
+          <a:chOff x="0" y="0"/>
+          <a:chExt cx="0" cy="0"/>
+        </a:xfrm>
+      </p:grpSpPr>
+      <p:sp>
+        <p:nvSpPr>
+          <p:cNvPr id="2" name="標題 1">
+            <a:extLst>
+              <a:ext uri="{FF2B5EF4-FFF2-40B4-BE49-F238E27FC236}">
+                <a16:creationId xmlns:a16="http://schemas.microsoft.com/office/drawing/2014/main" id="{3AAFAAE1-BAE4-4855-95BE-8CC6A9F33C0B}"/>
+              </a:ext>
+            </a:extLst>
+          </p:cNvPr>
+          <p:cNvSpPr>
+            <a:spLocks noGrp="1"/>
+          </p:cNvSpPr>
+          <p:nvPr>
+            <p:ph type="title"/>
+          </p:nvPr>
+        </p:nvSpPr>
+        <p:spPr/>
+        <p:txBody>
+          <a:bodyPr/>
+          <a:lstStyle/>
+          <a:p>
+            <a:r>
+              <a:rPr lang="en-US" altLang="zh-TW" dirty="0"/>
+              <a:t>Python Code</a:t>
+            </a:r>
+            <a:endParaRPr lang="zh-TW" altLang="en-US" dirty="0"/>
+          </a:p>
+        </p:txBody>
+      </p:sp>
+      <p:sp>
+        <p:nvSpPr>
+          <p:cNvPr id="4" name="日期版面配置區 3">
+            <a:extLst>
+              <a:ext uri="{FF2B5EF4-FFF2-40B4-BE49-F238E27FC236}">
+                <a16:creationId xmlns:a16="http://schemas.microsoft.com/office/drawing/2014/main" id="{9106CD2E-186F-4469-BA01-0D04FFED9E32}"/>
+              </a:ext>
+            </a:extLst>
+          </p:cNvPr>
+          <p:cNvSpPr>
+            <a:spLocks noGrp="1"/>
+          </p:cNvSpPr>
+          <p:nvPr>
+            <p:ph type="dt" sz="half" idx="10"/>
+          </p:nvPr>
+        </p:nvSpPr>
+        <p:spPr/>
+        <p:txBody>
+          <a:bodyPr/>
+          <a:lstStyle/>
+          <a:p>
+            <a:fld id="{D12744AA-2124-42E6-AA52-9077A6A76493}" type="datetime1">
+              <a:rPr lang="zh-TW" altLang="en-US" smtClean="0"/>
+              <a:t>2025/4/21</a:t>
+            </a:fld>
+            <a:endParaRPr lang="zh-TW" altLang="en-US"/>
+          </a:p>
+        </p:txBody>
+      </p:sp>
+      <p:sp>
+        <p:nvSpPr>
+          <p:cNvPr id="5" name="投影片編號版面配置區 4">
+            <a:extLst>
+              <a:ext uri="{FF2B5EF4-FFF2-40B4-BE49-F238E27FC236}">
+                <a16:creationId xmlns:a16="http://schemas.microsoft.com/office/drawing/2014/main" id="{10CD63D3-8EE8-456A-AD7C-5D5832D7514D}"/>
+              </a:ext>
+            </a:extLst>
+          </p:cNvPr>
+          <p:cNvSpPr>
+            <a:spLocks noGrp="1"/>
+          </p:cNvSpPr>
+          <p:nvPr>
+            <p:ph type="sldNum" sz="quarter" idx="12"/>
+          </p:nvPr>
+        </p:nvSpPr>
+        <p:spPr/>
+        <p:txBody>
+          <a:bodyPr/>
+          <a:lstStyle/>
+          <a:p>
+            <a:fld id="{13D67497-B2F6-4681-B86D-28F94DA14DA8}" type="slidenum">
+              <a:rPr lang="zh-TW" altLang="en-US" smtClean="0"/>
+              <a:t>16</a:t>
+            </a:fld>
+            <a:endParaRPr lang="zh-TW" altLang="en-US"/>
+          </a:p>
+        </p:txBody>
+      </p:sp>
+      <p:pic>
+        <p:nvPicPr>
+          <p:cNvPr id="14" name="圖片 13">
+            <a:extLst>
+              <a:ext uri="{FF2B5EF4-FFF2-40B4-BE49-F238E27FC236}">
+                <a16:creationId xmlns:a16="http://schemas.microsoft.com/office/drawing/2014/main" id="{DFFD6AA0-B567-4CEC-80B0-0017F18143E8}"/>
+              </a:ext>
+            </a:extLst>
+          </p:cNvPr>
+          <p:cNvPicPr>
+            <a:picLocks noChangeAspect="1"/>
+          </p:cNvPicPr>
+          <p:nvPr/>
+        </p:nvPicPr>
+        <p:blipFill>
+          <a:blip r:embed="rId2"/>
+          <a:stretch>
+            <a:fillRect/>
+          </a:stretch>
+        </p:blipFill>
+        <p:spPr>
+          <a:xfrm>
+            <a:off x="469986" y="2049729"/>
+            <a:ext cx="6588485" cy="3614642"/>
+          </a:xfrm>
+          <a:prstGeom prst="rect">
+            <a:avLst/>
+          </a:prstGeom>
+        </p:spPr>
+      </p:pic>
+      <p:pic>
+        <p:nvPicPr>
+          <p:cNvPr id="18" name="圖片 17">
+            <a:extLst>
+              <a:ext uri="{FF2B5EF4-FFF2-40B4-BE49-F238E27FC236}">
+                <a16:creationId xmlns:a16="http://schemas.microsoft.com/office/drawing/2014/main" id="{BB2486F9-0D8C-4659-AAF1-8A0553DE3074}"/>
+              </a:ext>
+            </a:extLst>
+          </p:cNvPr>
+          <p:cNvPicPr>
+            <a:picLocks noChangeAspect="1"/>
+          </p:cNvPicPr>
+          <p:nvPr/>
+        </p:nvPicPr>
+        <p:blipFill>
+          <a:blip r:embed="rId3"/>
+          <a:stretch>
+            <a:fillRect/>
+          </a:stretch>
+        </p:blipFill>
+        <p:spPr>
+          <a:xfrm>
+            <a:off x="7159305" y="2049729"/>
+            <a:ext cx="4755231" cy="2080413"/>
+          </a:xfrm>
+          <a:prstGeom prst="rect">
+            <a:avLst/>
+          </a:prstGeom>
+        </p:spPr>
+      </p:pic>
+    </p:spTree>
+    <p:extLst>
+      <p:ext uri="{BB962C8B-B14F-4D97-AF65-F5344CB8AC3E}">
+        <p14:creationId xmlns:p14="http://schemas.microsoft.com/office/powerpoint/2010/main" val="4252578091"/>
+      </p:ext>
+    </p:extLst>
+  </p:cSld>
+  <p:clrMapOvr>
+    <a:masterClrMapping/>
+  </p:clrMapOvr>
+</p:sld>
+</file>
+
+<file path=ppt/slides/slide17.xml><?xml version="1.0" encoding="utf-8"?>
+<p:sld xmlns:a="http://schemas.openxmlformats.org/drawingml/2006/main" xmlns:r="http://schemas.openxmlformats.org/officeDocument/2006/relationships" xmlns:p="http://schemas.openxmlformats.org/presentationml/2006/main">
+  <p:cSld>
+    <p:spTree>
+      <p:nvGrpSpPr>
+        <p:cNvPr id="1" name=""/>
+        <p:cNvGrpSpPr/>
+        <p:nvPr/>
+      </p:nvGrpSpPr>
+      <p:grpSpPr>
+        <a:xfrm>
+          <a:off x="0" y="0"/>
+          <a:ext cx="0" cy="0"/>
+          <a:chOff x="0" y="0"/>
+          <a:chExt cx="0" cy="0"/>
+        </a:xfrm>
+      </p:grpSpPr>
+      <p:sp>
+        <p:nvSpPr>
+          <p:cNvPr id="2" name="標題 1">
+            <a:extLst>
+              <a:ext uri="{FF2B5EF4-FFF2-40B4-BE49-F238E27FC236}">
+                <a16:creationId xmlns:a16="http://schemas.microsoft.com/office/drawing/2014/main" id="{9C7A286E-103E-4E80-B792-AACB9430CF29}"/>
+              </a:ext>
+            </a:extLst>
+          </p:cNvPr>
+          <p:cNvSpPr>
+            <a:spLocks noGrp="1"/>
+          </p:cNvSpPr>
+          <p:nvPr>
+            <p:ph type="title"/>
+          </p:nvPr>
+        </p:nvSpPr>
+        <p:spPr/>
+        <p:txBody>
+          <a:bodyPr/>
+          <a:lstStyle/>
+          <a:p>
+            <a:r>
+              <a:rPr lang="en-US" altLang="zh-TW" dirty="0"/>
+              <a:t>Verilog Code for Int4 MAC</a:t>
+            </a:r>
+            <a:endParaRPr lang="zh-TW" altLang="en-US" dirty="0"/>
+          </a:p>
+        </p:txBody>
+      </p:sp>
+      <p:sp>
+        <p:nvSpPr>
+          <p:cNvPr id="3" name="內容版面配置區 2">
+            <a:extLst>
+              <a:ext uri="{FF2B5EF4-FFF2-40B4-BE49-F238E27FC236}">
+                <a16:creationId xmlns:a16="http://schemas.microsoft.com/office/drawing/2014/main" id="{07A03181-15A6-487E-9555-F852AE106FC4}"/>
+              </a:ext>
+            </a:extLst>
+          </p:cNvPr>
+          <p:cNvSpPr>
+            <a:spLocks noGrp="1"/>
+          </p:cNvSpPr>
+          <p:nvPr>
+            <p:ph idx="1"/>
+          </p:nvPr>
+        </p:nvSpPr>
+        <p:spPr/>
+        <p:txBody>
+          <a:bodyPr/>
+          <a:lstStyle/>
+          <a:p>
+            <a:endParaRPr lang="zh-TW" altLang="en-US"/>
+          </a:p>
+        </p:txBody>
+      </p:sp>
+      <p:sp>
+        <p:nvSpPr>
+          <p:cNvPr id="4" name="日期版面配置區 3">
+            <a:extLst>
+              <a:ext uri="{FF2B5EF4-FFF2-40B4-BE49-F238E27FC236}">
+                <a16:creationId xmlns:a16="http://schemas.microsoft.com/office/drawing/2014/main" id="{39195FEE-5D23-438D-A949-C8BA6222FB21}"/>
+              </a:ext>
+            </a:extLst>
+          </p:cNvPr>
+          <p:cNvSpPr>
+            <a:spLocks noGrp="1"/>
+          </p:cNvSpPr>
+          <p:nvPr>
+            <p:ph type="dt" sz="half" idx="10"/>
+          </p:nvPr>
+        </p:nvSpPr>
+        <p:spPr/>
+        <p:txBody>
+          <a:bodyPr/>
+          <a:lstStyle/>
+          <a:p>
+            <a:fld id="{D12744AA-2124-42E6-AA52-9077A6A76493}" type="datetime1">
+              <a:rPr lang="zh-TW" altLang="en-US" smtClean="0"/>
+              <a:t>2025/4/21</a:t>
+            </a:fld>
+            <a:endParaRPr lang="zh-TW" altLang="en-US"/>
+          </a:p>
+        </p:txBody>
+      </p:sp>
+      <p:sp>
+        <p:nvSpPr>
+          <p:cNvPr id="5" name="投影片編號版面配置區 4">
+            <a:extLst>
+              <a:ext uri="{FF2B5EF4-FFF2-40B4-BE49-F238E27FC236}">
+                <a16:creationId xmlns:a16="http://schemas.microsoft.com/office/drawing/2014/main" id="{61285C94-D3AC-4860-A8CF-F31DBA57D65A}"/>
+              </a:ext>
+            </a:extLst>
+          </p:cNvPr>
+          <p:cNvSpPr>
+            <a:spLocks noGrp="1"/>
+          </p:cNvSpPr>
+          <p:nvPr>
+            <p:ph type="sldNum" sz="quarter" idx="12"/>
+          </p:nvPr>
+        </p:nvSpPr>
+        <p:spPr/>
+        <p:txBody>
+          <a:bodyPr/>
+          <a:lstStyle/>
+          <a:p>
+            <a:fld id="{13D67497-B2F6-4681-B86D-28F94DA14DA8}" type="slidenum">
+              <a:rPr lang="zh-TW" altLang="en-US" smtClean="0"/>
+              <a:t>17</a:t>
+            </a:fld>
+            <a:endParaRPr lang="zh-TW" altLang="en-US"/>
+          </a:p>
+        </p:txBody>
+      </p:sp>
+      <p:pic>
+        <p:nvPicPr>
+          <p:cNvPr id="7" name="圖片 6">
+            <a:extLst>
+              <a:ext uri="{FF2B5EF4-FFF2-40B4-BE49-F238E27FC236}">
+                <a16:creationId xmlns:a16="http://schemas.microsoft.com/office/drawing/2014/main" id="{277175BB-9D44-4C07-B09E-3EED7A70C835}"/>
+              </a:ext>
+            </a:extLst>
+          </p:cNvPr>
+          <p:cNvPicPr>
+            <a:picLocks noChangeAspect="1"/>
+          </p:cNvPicPr>
+          <p:nvPr/>
+        </p:nvPicPr>
+        <p:blipFill>
+          <a:blip r:embed="rId2"/>
+          <a:stretch>
+            <a:fillRect/>
+          </a:stretch>
+        </p:blipFill>
+        <p:spPr>
+          <a:xfrm>
+            <a:off x="580315" y="1622567"/>
+            <a:ext cx="4606886" cy="4733783"/>
+          </a:xfrm>
+          <a:prstGeom prst="rect">
+            <a:avLst/>
+          </a:prstGeom>
+        </p:spPr>
+      </p:pic>
+      <p:pic>
+        <p:nvPicPr>
+          <p:cNvPr id="11" name="圖片 10">
+            <a:extLst>
+              <a:ext uri="{FF2B5EF4-FFF2-40B4-BE49-F238E27FC236}">
+                <a16:creationId xmlns:a16="http://schemas.microsoft.com/office/drawing/2014/main" id="{42866DA6-8620-4F01-8791-F4F00FB77CE5}"/>
+              </a:ext>
+            </a:extLst>
+          </p:cNvPr>
+          <p:cNvPicPr>
+            <a:picLocks noChangeAspect="1"/>
+          </p:cNvPicPr>
+          <p:nvPr/>
+        </p:nvPicPr>
+        <p:blipFill>
+          <a:blip r:embed="rId3"/>
+          <a:stretch>
+            <a:fillRect/>
+          </a:stretch>
+        </p:blipFill>
+        <p:spPr>
+          <a:xfrm>
+            <a:off x="5383655" y="1619753"/>
+            <a:ext cx="6374671" cy="4736597"/>
+          </a:xfrm>
+          <a:prstGeom prst="rect">
+            <a:avLst/>
+          </a:prstGeom>
+        </p:spPr>
+      </p:pic>
+    </p:spTree>
+    <p:extLst>
+      <p:ext uri="{BB962C8B-B14F-4D97-AF65-F5344CB8AC3E}">
+        <p14:creationId xmlns:p14="http://schemas.microsoft.com/office/powerpoint/2010/main" val="3115268229"/>
+      </p:ext>
+    </p:extLst>
+  </p:cSld>
+  <p:clrMapOvr>
+    <a:masterClrMapping/>
+  </p:clrMapOvr>
+</p:sld>
+</file>
+
+<file path=ppt/slides/slide18.xml><?xml version="1.0" encoding="utf-8"?>
+<p:sld xmlns:a="http://schemas.openxmlformats.org/drawingml/2006/main" xmlns:r="http://schemas.openxmlformats.org/officeDocument/2006/relationships" xmlns:p="http://schemas.openxmlformats.org/presentationml/2006/main">
+  <p:cSld>
+    <p:spTree>
+      <p:nvGrpSpPr>
+        <p:cNvPr id="1" name=""/>
+        <p:cNvGrpSpPr/>
+        <p:nvPr/>
+      </p:nvGrpSpPr>
+      <p:grpSpPr>
+        <a:xfrm>
+          <a:off x="0" y="0"/>
+          <a:ext cx="0" cy="0"/>
+          <a:chOff x="0" y="0"/>
+          <a:chExt cx="0" cy="0"/>
+        </a:xfrm>
+      </p:grpSpPr>
+      <p:sp>
+        <p:nvSpPr>
+          <p:cNvPr id="2" name="標題 1">
+            <a:extLst>
+              <a:ext uri="{FF2B5EF4-FFF2-40B4-BE49-F238E27FC236}">
+                <a16:creationId xmlns:a16="http://schemas.microsoft.com/office/drawing/2014/main" id="{004324F3-1CE0-4C16-A8F5-69A6D44DEA32}"/>
+              </a:ext>
+            </a:extLst>
+          </p:cNvPr>
+          <p:cNvSpPr>
+            <a:spLocks noGrp="1"/>
+          </p:cNvSpPr>
+          <p:nvPr>
+            <p:ph type="title"/>
+          </p:nvPr>
+        </p:nvSpPr>
+        <p:spPr/>
+        <p:txBody>
+          <a:bodyPr/>
+          <a:lstStyle/>
+          <a:p>
+            <a:r>
+              <a:rPr lang="en-US" altLang="zh-TW" dirty="0"/>
+              <a:t>Verilog Code for VSQ-Support</a:t>
+            </a:r>
+            <a:endParaRPr lang="zh-TW" altLang="en-US" dirty="0"/>
+          </a:p>
+        </p:txBody>
+      </p:sp>
+      <p:sp>
+        <p:nvSpPr>
+          <p:cNvPr id="3" name="內容版面配置區 2">
+            <a:extLst>
+              <a:ext uri="{FF2B5EF4-FFF2-40B4-BE49-F238E27FC236}">
+                <a16:creationId xmlns:a16="http://schemas.microsoft.com/office/drawing/2014/main" id="{9FE169CE-CE57-4297-8DCD-FE430658703A}"/>
+              </a:ext>
+            </a:extLst>
+          </p:cNvPr>
+          <p:cNvSpPr>
+            <a:spLocks noGrp="1"/>
+          </p:cNvSpPr>
+          <p:nvPr>
+            <p:ph idx="1"/>
+          </p:nvPr>
+        </p:nvSpPr>
+        <p:spPr/>
+        <p:txBody>
+          <a:bodyPr/>
+          <a:lstStyle/>
+          <a:p>
+            <a:endParaRPr lang="zh-TW" altLang="en-US"/>
+          </a:p>
+        </p:txBody>
+      </p:sp>
+      <p:sp>
+        <p:nvSpPr>
+          <p:cNvPr id="4" name="日期版面配置區 3">
+            <a:extLst>
+              <a:ext uri="{FF2B5EF4-FFF2-40B4-BE49-F238E27FC236}">
+                <a16:creationId xmlns:a16="http://schemas.microsoft.com/office/drawing/2014/main" id="{C41E8691-33C3-45DA-AEA2-8C2315C437E8}"/>
+              </a:ext>
+            </a:extLst>
+          </p:cNvPr>
+          <p:cNvSpPr>
+            <a:spLocks noGrp="1"/>
+          </p:cNvSpPr>
+          <p:nvPr>
+            <p:ph type="dt" sz="half" idx="10"/>
+          </p:nvPr>
+        </p:nvSpPr>
+        <p:spPr/>
+        <p:txBody>
+          <a:bodyPr/>
+          <a:lstStyle/>
+          <a:p>
+            <a:fld id="{D12744AA-2124-42E6-AA52-9077A6A76493}" type="datetime1">
+              <a:rPr lang="zh-TW" altLang="en-US" smtClean="0"/>
+              <a:t>2025/4/21</a:t>
+            </a:fld>
+            <a:endParaRPr lang="zh-TW" altLang="en-US"/>
+          </a:p>
+        </p:txBody>
+      </p:sp>
+      <p:sp>
+        <p:nvSpPr>
+          <p:cNvPr id="5" name="投影片編號版面配置區 4">
+            <a:extLst>
+              <a:ext uri="{FF2B5EF4-FFF2-40B4-BE49-F238E27FC236}">
+                <a16:creationId xmlns:a16="http://schemas.microsoft.com/office/drawing/2014/main" id="{98F5BE70-40FF-4FB3-8936-A23ACB291A23}"/>
+              </a:ext>
+            </a:extLst>
+          </p:cNvPr>
+          <p:cNvSpPr>
+            <a:spLocks noGrp="1"/>
+          </p:cNvSpPr>
+          <p:nvPr>
+            <p:ph type="sldNum" sz="quarter" idx="12"/>
+          </p:nvPr>
+        </p:nvSpPr>
+        <p:spPr/>
+        <p:txBody>
+          <a:bodyPr/>
+          <a:lstStyle/>
+          <a:p>
+            <a:fld id="{13D67497-B2F6-4681-B86D-28F94DA14DA8}" type="slidenum">
+              <a:rPr lang="zh-TW" altLang="en-US" smtClean="0"/>
+              <a:t>18</a:t>
+            </a:fld>
+            <a:endParaRPr lang="zh-TW" altLang="en-US"/>
+          </a:p>
+        </p:txBody>
+      </p:sp>
+      <p:pic>
+        <p:nvPicPr>
+          <p:cNvPr id="9" name="圖片 8">
+            <a:extLst>
+              <a:ext uri="{FF2B5EF4-FFF2-40B4-BE49-F238E27FC236}">
+                <a16:creationId xmlns:a16="http://schemas.microsoft.com/office/drawing/2014/main" id="{5AC347B1-95AD-4A9A-A52A-D6EA8ACB011E}"/>
+              </a:ext>
+            </a:extLst>
+          </p:cNvPr>
+          <p:cNvPicPr>
+            <a:picLocks noChangeAspect="1"/>
+          </p:cNvPicPr>
+          <p:nvPr/>
+        </p:nvPicPr>
+        <p:blipFill>
+          <a:blip r:embed="rId2"/>
+          <a:stretch>
+            <a:fillRect/>
+          </a:stretch>
+        </p:blipFill>
+        <p:spPr>
+          <a:xfrm>
+            <a:off x="9001083" y="1742883"/>
+            <a:ext cx="2274450" cy="4298907"/>
+          </a:xfrm>
+          <a:prstGeom prst="rect">
+            <a:avLst/>
+          </a:prstGeom>
+        </p:spPr>
+      </p:pic>
+      <p:pic>
+        <p:nvPicPr>
+          <p:cNvPr id="11" name="圖片 10">
+            <a:extLst>
+              <a:ext uri="{FF2B5EF4-FFF2-40B4-BE49-F238E27FC236}">
+                <a16:creationId xmlns:a16="http://schemas.microsoft.com/office/drawing/2014/main" id="{47663033-6035-44FA-B319-E3786C7C5701}"/>
+              </a:ext>
+            </a:extLst>
+          </p:cNvPr>
+          <p:cNvPicPr>
+            <a:picLocks noChangeAspect="1"/>
+          </p:cNvPicPr>
+          <p:nvPr/>
+        </p:nvPicPr>
+        <p:blipFill>
+          <a:blip r:embed="rId3"/>
+          <a:stretch>
+            <a:fillRect/>
+          </a:stretch>
+        </p:blipFill>
+        <p:spPr>
+          <a:xfrm>
+            <a:off x="441857" y="2174335"/>
+            <a:ext cx="8272558" cy="3299204"/>
+          </a:xfrm>
+          <a:prstGeom prst="rect">
+            <a:avLst/>
+          </a:prstGeom>
+        </p:spPr>
+      </p:pic>
+    </p:spTree>
+    <p:extLst>
+      <p:ext uri="{BB962C8B-B14F-4D97-AF65-F5344CB8AC3E}">
+        <p14:creationId xmlns:p14="http://schemas.microsoft.com/office/powerpoint/2010/main" val="3334431185"/>
+      </p:ext>
+    </p:extLst>
+  </p:cSld>
+  <p:clrMapOvr>
+    <a:masterClrMapping/>
+  </p:clrMapOvr>
+</p:sld>
+</file>
+
+<file path=ppt/slides/slide19.xml><?xml version="1.0" encoding="utf-8"?>
+<p:sld xmlns:a="http://schemas.openxmlformats.org/drawingml/2006/main" xmlns:r="http://schemas.openxmlformats.org/officeDocument/2006/relationships" xmlns:p="http://schemas.openxmlformats.org/presentationml/2006/main">
+  <p:cSld>
+    <p:spTree>
+      <p:nvGrpSpPr>
+        <p:cNvPr id="1" name=""/>
+        <p:cNvGrpSpPr/>
+        <p:nvPr/>
+      </p:nvGrpSpPr>
+      <p:grpSpPr>
+        <a:xfrm>
+          <a:off x="0" y="0"/>
+          <a:ext cx="0" cy="0"/>
+          <a:chOff x="0" y="0"/>
+          <a:chExt cx="0" cy="0"/>
+        </a:xfrm>
+      </p:grpSpPr>
+      <p:sp>
+        <p:nvSpPr>
+          <p:cNvPr id="2" name="標題 1">
+            <a:extLst>
+              <a:ext uri="{FF2B5EF4-FFF2-40B4-BE49-F238E27FC236}">
+                <a16:creationId xmlns:a16="http://schemas.microsoft.com/office/drawing/2014/main" id="{DD71AAEC-2310-4A88-87EE-E3F4FAE4070D}"/>
+              </a:ext>
+            </a:extLst>
+          </p:cNvPr>
+          <p:cNvSpPr>
+            <a:spLocks noGrp="1"/>
+          </p:cNvSpPr>
+          <p:nvPr>
+            <p:ph type="title"/>
+          </p:nvPr>
+        </p:nvSpPr>
+        <p:spPr/>
+        <p:txBody>
+          <a:bodyPr/>
+          <a:lstStyle/>
+          <a:p>
+            <a:r>
+              <a:rPr lang="en-US" altLang="zh-TW" dirty="0"/>
+              <a:t>Verilog Code for a single MAC </a:t>
+            </a:r>
+            <a:r>
+              <a:rPr lang="en-US" altLang="zh-TW" dirty="0" err="1"/>
+              <a:t>datapath</a:t>
+            </a:r>
+            <a:endParaRPr lang="zh-TW" altLang="en-US" dirty="0"/>
+          </a:p>
+        </p:txBody>
+      </p:sp>
+      <p:sp>
+        <p:nvSpPr>
+          <p:cNvPr id="3" name="內容版面配置區 2">
+            <a:extLst>
+              <a:ext uri="{FF2B5EF4-FFF2-40B4-BE49-F238E27FC236}">
+                <a16:creationId xmlns:a16="http://schemas.microsoft.com/office/drawing/2014/main" id="{BA9DFBF7-514E-46C9-A3E2-299A44E76074}"/>
+              </a:ext>
+            </a:extLst>
+          </p:cNvPr>
+          <p:cNvSpPr>
+            <a:spLocks noGrp="1"/>
+          </p:cNvSpPr>
+          <p:nvPr>
+            <p:ph idx="1"/>
+          </p:nvPr>
+        </p:nvSpPr>
+        <p:spPr/>
+        <p:txBody>
+          <a:bodyPr/>
+          <a:lstStyle/>
+          <a:p>
+            <a:endParaRPr lang="zh-TW" altLang="en-US"/>
+          </a:p>
+        </p:txBody>
+      </p:sp>
+      <p:sp>
+        <p:nvSpPr>
+          <p:cNvPr id="4" name="日期版面配置區 3">
+            <a:extLst>
+              <a:ext uri="{FF2B5EF4-FFF2-40B4-BE49-F238E27FC236}">
+                <a16:creationId xmlns:a16="http://schemas.microsoft.com/office/drawing/2014/main" id="{17F772FF-4207-4656-8AD7-D1A412B86E37}"/>
+              </a:ext>
+            </a:extLst>
+          </p:cNvPr>
+          <p:cNvSpPr>
+            <a:spLocks noGrp="1"/>
+          </p:cNvSpPr>
+          <p:nvPr>
+            <p:ph type="dt" sz="half" idx="10"/>
+          </p:nvPr>
+        </p:nvSpPr>
+        <p:spPr/>
+        <p:txBody>
+          <a:bodyPr/>
+          <a:lstStyle/>
+          <a:p>
+            <a:fld id="{D12744AA-2124-42E6-AA52-9077A6A76493}" type="datetime1">
+              <a:rPr lang="zh-TW" altLang="en-US" smtClean="0"/>
+              <a:t>2025/4/21</a:t>
+            </a:fld>
+            <a:endParaRPr lang="zh-TW" altLang="en-US"/>
+          </a:p>
+        </p:txBody>
+      </p:sp>
+      <p:sp>
+        <p:nvSpPr>
+          <p:cNvPr id="5" name="投影片編號版面配置區 4">
+            <a:extLst>
+              <a:ext uri="{FF2B5EF4-FFF2-40B4-BE49-F238E27FC236}">
+                <a16:creationId xmlns:a16="http://schemas.microsoft.com/office/drawing/2014/main" id="{E4C1CBBF-1497-45DB-99C7-3921123E4994}"/>
+              </a:ext>
+            </a:extLst>
+          </p:cNvPr>
+          <p:cNvSpPr>
+            <a:spLocks noGrp="1"/>
+          </p:cNvSpPr>
+          <p:nvPr>
+            <p:ph type="sldNum" sz="quarter" idx="12"/>
+          </p:nvPr>
+        </p:nvSpPr>
+        <p:spPr/>
+        <p:txBody>
+          <a:bodyPr/>
+          <a:lstStyle/>
+          <a:p>
+            <a:fld id="{13D67497-B2F6-4681-B86D-28F94DA14DA8}" type="slidenum">
+              <a:rPr lang="zh-TW" altLang="en-US" smtClean="0"/>
+              <a:t>19</a:t>
+            </a:fld>
+            <a:endParaRPr lang="zh-TW" altLang="en-US"/>
+          </a:p>
+        </p:txBody>
+      </p:sp>
+      <p:pic>
+        <p:nvPicPr>
+          <p:cNvPr id="7" name="圖片 6">
+            <a:extLst>
+              <a:ext uri="{FF2B5EF4-FFF2-40B4-BE49-F238E27FC236}">
+                <a16:creationId xmlns:a16="http://schemas.microsoft.com/office/drawing/2014/main" id="{6361B3FF-49F3-4BC7-9684-A34E8241FA12}"/>
+              </a:ext>
+            </a:extLst>
+          </p:cNvPr>
+          <p:cNvPicPr>
+            <a:picLocks noChangeAspect="1"/>
+          </p:cNvPicPr>
+          <p:nvPr/>
+        </p:nvPicPr>
+        <p:blipFill>
+          <a:blip r:embed="rId2"/>
+          <a:stretch>
+            <a:fillRect/>
+          </a:stretch>
+        </p:blipFill>
+        <p:spPr>
+          <a:xfrm>
+            <a:off x="973090" y="1734036"/>
+            <a:ext cx="3495386" cy="4622314"/>
+          </a:xfrm>
+          <a:prstGeom prst="rect">
+            <a:avLst/>
+          </a:prstGeom>
+        </p:spPr>
+      </p:pic>
+      <p:pic>
+        <p:nvPicPr>
+          <p:cNvPr id="9" name="圖片 8">
+            <a:extLst>
+              <a:ext uri="{FF2B5EF4-FFF2-40B4-BE49-F238E27FC236}">
+                <a16:creationId xmlns:a16="http://schemas.microsoft.com/office/drawing/2014/main" id="{4E911823-84FD-45CC-930E-1E005C1FEB03}"/>
+              </a:ext>
+            </a:extLst>
+          </p:cNvPr>
+          <p:cNvPicPr>
+            <a:picLocks noChangeAspect="1"/>
+          </p:cNvPicPr>
+          <p:nvPr/>
+        </p:nvPicPr>
+        <p:blipFill>
+          <a:blip r:embed="rId3"/>
+          <a:stretch>
+            <a:fillRect/>
+          </a:stretch>
+        </p:blipFill>
+        <p:spPr>
+          <a:xfrm>
+            <a:off x="4566263" y="3045483"/>
+            <a:ext cx="6450407" cy="1484061"/>
+          </a:xfrm>
+          <a:prstGeom prst="rect">
+            <a:avLst/>
+          </a:prstGeom>
+        </p:spPr>
+      </p:pic>
+    </p:spTree>
+    <p:extLst>
+      <p:ext uri="{BB962C8B-B14F-4D97-AF65-F5344CB8AC3E}">
+        <p14:creationId xmlns:p14="http://schemas.microsoft.com/office/powerpoint/2010/main" val="2536210961"/>
+      </p:ext>
+    </p:extLst>
+  </p:cSld>
+  <p:clrMapOvr>
+    <a:masterClrMapping/>
+  </p:clrMapOvr>
+</p:sld>
+</file>
+
 <file path=ppt/slides/slide2.xml><?xml version="1.0" encoding="utf-8"?>
 <p:sld xmlns:a="http://schemas.openxmlformats.org/drawingml/2006/main" xmlns:r="http://schemas.openxmlformats.org/officeDocument/2006/relationships" xmlns:p="http://schemas.openxmlformats.org/presentationml/2006/main">
   <p:cSld>
@@ -8108,8 +9139,8 @@
           </a:p>
         </p:txBody>
       </p:sp>
-      <mc:AlternateContent xmlns:mc="http://schemas.openxmlformats.org/markup-compatibility/2006">
-        <mc:Choice xmlns:a14="http://schemas.microsoft.com/office/drawing/2010/main" Requires="a14">
+      <mc:AlternateContent xmlns:mc="http://schemas.openxmlformats.org/markup-compatibility/2006" xmlns:a14="http://schemas.microsoft.com/office/drawing/2010/main">
+        <mc:Choice Requires="a14">
           <p:sp>
             <p:nvSpPr>
               <p:cNvPr id="3" name="內容版面配置區 2">
@@ -8278,7 +9309,7 @@
             </p:txBody>
           </p:sp>
         </mc:Choice>
-        <mc:Fallback>
+        <mc:Fallback xmlns="">
           <p:sp>
             <p:nvSpPr>
               <p:cNvPr id="3" name="內容版面配置區 2">
@@ -8341,7 +9372,7 @@
           <a:p>
             <a:fld id="{D12744AA-2124-42E6-AA52-9077A6A76493}" type="datetime1">
               <a:rPr lang="zh-TW" altLang="en-US" smtClean="0"/>
-              <a:t>2025/4/19</a:t>
+              <a:t>2025/4/21</a:t>
             </a:fld>
             <a:endParaRPr lang="zh-TW" altLang="en-US"/>
           </a:p>
@@ -8380,6 +9411,556 @@
     <p:extLst>
       <p:ext uri="{BB962C8B-B14F-4D97-AF65-F5344CB8AC3E}">
         <p14:creationId xmlns:p14="http://schemas.microsoft.com/office/powerpoint/2010/main" val="103561547"/>
+      </p:ext>
+    </p:extLst>
+  </p:cSld>
+  <p:clrMapOvr>
+    <a:masterClrMapping/>
+  </p:clrMapOvr>
+</p:sld>
+</file>
+
+<file path=ppt/slides/slide20.xml><?xml version="1.0" encoding="utf-8"?>
+<p:sld xmlns:a="http://schemas.openxmlformats.org/drawingml/2006/main" xmlns:r="http://schemas.openxmlformats.org/officeDocument/2006/relationships" xmlns:p="http://schemas.openxmlformats.org/presentationml/2006/main">
+  <p:cSld>
+    <p:spTree>
+      <p:nvGrpSpPr>
+        <p:cNvPr id="1" name=""/>
+        <p:cNvGrpSpPr/>
+        <p:nvPr/>
+      </p:nvGrpSpPr>
+      <p:grpSpPr>
+        <a:xfrm>
+          <a:off x="0" y="0"/>
+          <a:ext cx="0" cy="0"/>
+          <a:chOff x="0" y="0"/>
+          <a:chExt cx="0" cy="0"/>
+        </a:xfrm>
+      </p:grpSpPr>
+      <p:sp>
+        <p:nvSpPr>
+          <p:cNvPr id="2" name="標題 1">
+            <a:extLst>
+              <a:ext uri="{FF2B5EF4-FFF2-40B4-BE49-F238E27FC236}">
+                <a16:creationId xmlns:a16="http://schemas.microsoft.com/office/drawing/2014/main" id="{D600DE9A-7953-46B6-A3C9-52948956D850}"/>
+              </a:ext>
+            </a:extLst>
+          </p:cNvPr>
+          <p:cNvSpPr>
+            <a:spLocks noGrp="1"/>
+          </p:cNvSpPr>
+          <p:nvPr>
+            <p:ph type="title"/>
+          </p:nvPr>
+        </p:nvSpPr>
+        <p:spPr/>
+        <p:txBody>
+          <a:bodyPr/>
+          <a:lstStyle/>
+          <a:p>
+            <a:r>
+              <a:rPr lang="en-US" altLang="zh-TW" dirty="0"/>
+              <a:t>Testbench</a:t>
+            </a:r>
+            <a:endParaRPr lang="zh-TW" altLang="en-US" dirty="0"/>
+          </a:p>
+        </p:txBody>
+      </p:sp>
+      <p:sp>
+        <p:nvSpPr>
+          <p:cNvPr id="3" name="內容版面配置區 2">
+            <a:extLst>
+              <a:ext uri="{FF2B5EF4-FFF2-40B4-BE49-F238E27FC236}">
+                <a16:creationId xmlns:a16="http://schemas.microsoft.com/office/drawing/2014/main" id="{8353C71B-AEB7-46FD-B534-547BF855BE52}"/>
+              </a:ext>
+            </a:extLst>
+          </p:cNvPr>
+          <p:cNvSpPr>
+            <a:spLocks noGrp="1"/>
+          </p:cNvSpPr>
+          <p:nvPr>
+            <p:ph idx="1"/>
+          </p:nvPr>
+        </p:nvSpPr>
+        <p:spPr/>
+        <p:txBody>
+          <a:bodyPr/>
+          <a:lstStyle/>
+          <a:p>
+            <a:endParaRPr lang="zh-TW" altLang="en-US"/>
+          </a:p>
+        </p:txBody>
+      </p:sp>
+      <p:sp>
+        <p:nvSpPr>
+          <p:cNvPr id="4" name="日期版面配置區 3">
+            <a:extLst>
+              <a:ext uri="{FF2B5EF4-FFF2-40B4-BE49-F238E27FC236}">
+                <a16:creationId xmlns:a16="http://schemas.microsoft.com/office/drawing/2014/main" id="{339EE32C-A358-43AA-8B13-F5CD6B68FEA9}"/>
+              </a:ext>
+            </a:extLst>
+          </p:cNvPr>
+          <p:cNvSpPr>
+            <a:spLocks noGrp="1"/>
+          </p:cNvSpPr>
+          <p:nvPr>
+            <p:ph type="dt" sz="half" idx="10"/>
+          </p:nvPr>
+        </p:nvSpPr>
+        <p:spPr/>
+        <p:txBody>
+          <a:bodyPr/>
+          <a:lstStyle/>
+          <a:p>
+            <a:fld id="{D12744AA-2124-42E6-AA52-9077A6A76493}" type="datetime1">
+              <a:rPr lang="zh-TW" altLang="en-US" smtClean="0"/>
+              <a:t>2025/4/21</a:t>
+            </a:fld>
+            <a:endParaRPr lang="zh-TW" altLang="en-US"/>
+          </a:p>
+        </p:txBody>
+      </p:sp>
+      <p:sp>
+        <p:nvSpPr>
+          <p:cNvPr id="5" name="投影片編號版面配置區 4">
+            <a:extLst>
+              <a:ext uri="{FF2B5EF4-FFF2-40B4-BE49-F238E27FC236}">
+                <a16:creationId xmlns:a16="http://schemas.microsoft.com/office/drawing/2014/main" id="{AB63288B-F13A-4BC2-A924-0FCDE811BEE3}"/>
+              </a:ext>
+            </a:extLst>
+          </p:cNvPr>
+          <p:cNvSpPr>
+            <a:spLocks noGrp="1"/>
+          </p:cNvSpPr>
+          <p:nvPr>
+            <p:ph type="sldNum" sz="quarter" idx="12"/>
+          </p:nvPr>
+        </p:nvSpPr>
+        <p:spPr/>
+        <p:txBody>
+          <a:bodyPr/>
+          <a:lstStyle/>
+          <a:p>
+            <a:fld id="{13D67497-B2F6-4681-B86D-28F94DA14DA8}" type="slidenum">
+              <a:rPr lang="zh-TW" altLang="en-US" smtClean="0"/>
+              <a:t>20</a:t>
+            </a:fld>
+            <a:endParaRPr lang="zh-TW" altLang="en-US"/>
+          </a:p>
+        </p:txBody>
+      </p:sp>
+      <p:pic>
+        <p:nvPicPr>
+          <p:cNvPr id="7" name="圖片 6">
+            <a:extLst>
+              <a:ext uri="{FF2B5EF4-FFF2-40B4-BE49-F238E27FC236}">
+                <a16:creationId xmlns:a16="http://schemas.microsoft.com/office/drawing/2014/main" id="{313EA66A-66B9-4E19-9275-6D4AAD73DC99}"/>
+              </a:ext>
+            </a:extLst>
+          </p:cNvPr>
+          <p:cNvPicPr>
+            <a:picLocks noChangeAspect="1"/>
+          </p:cNvPicPr>
+          <p:nvPr/>
+        </p:nvPicPr>
+        <p:blipFill>
+          <a:blip r:embed="rId2"/>
+          <a:stretch>
+            <a:fillRect/>
+          </a:stretch>
+        </p:blipFill>
+        <p:spPr>
+          <a:xfrm>
+            <a:off x="689947" y="1825625"/>
+            <a:ext cx="4231857" cy="4315601"/>
+          </a:xfrm>
+          <a:prstGeom prst="rect">
+            <a:avLst/>
+          </a:prstGeom>
+        </p:spPr>
+      </p:pic>
+      <p:pic>
+        <p:nvPicPr>
+          <p:cNvPr id="9" name="圖片 8">
+            <a:extLst>
+              <a:ext uri="{FF2B5EF4-FFF2-40B4-BE49-F238E27FC236}">
+                <a16:creationId xmlns:a16="http://schemas.microsoft.com/office/drawing/2014/main" id="{71C626F9-7B86-4B58-9FC5-8BDECE09D4F7}"/>
+              </a:ext>
+            </a:extLst>
+          </p:cNvPr>
+          <p:cNvPicPr>
+            <a:picLocks noChangeAspect="1"/>
+          </p:cNvPicPr>
+          <p:nvPr/>
+        </p:nvPicPr>
+        <p:blipFill>
+          <a:blip r:embed="rId3"/>
+          <a:stretch>
+            <a:fillRect/>
+          </a:stretch>
+        </p:blipFill>
+        <p:spPr>
+          <a:xfrm>
+            <a:off x="5008629" y="1842019"/>
+            <a:ext cx="6927667" cy="3173961"/>
+          </a:xfrm>
+          <a:prstGeom prst="rect">
+            <a:avLst/>
+          </a:prstGeom>
+        </p:spPr>
+      </p:pic>
+    </p:spTree>
+    <p:extLst>
+      <p:ext uri="{BB962C8B-B14F-4D97-AF65-F5344CB8AC3E}">
+        <p14:creationId xmlns:p14="http://schemas.microsoft.com/office/powerpoint/2010/main" val="1783958721"/>
+      </p:ext>
+    </p:extLst>
+  </p:cSld>
+  <p:clrMapOvr>
+    <a:masterClrMapping/>
+  </p:clrMapOvr>
+</p:sld>
+</file>
+
+<file path=ppt/slides/slide21.xml><?xml version="1.0" encoding="utf-8"?>
+<p:sld xmlns:a="http://schemas.openxmlformats.org/drawingml/2006/main" xmlns:r="http://schemas.openxmlformats.org/officeDocument/2006/relationships" xmlns:p="http://schemas.openxmlformats.org/presentationml/2006/main">
+  <p:cSld>
+    <p:spTree>
+      <p:nvGrpSpPr>
+        <p:cNvPr id="1" name=""/>
+        <p:cNvGrpSpPr/>
+        <p:nvPr/>
+      </p:nvGrpSpPr>
+      <p:grpSpPr>
+        <a:xfrm>
+          <a:off x="0" y="0"/>
+          <a:ext cx="0" cy="0"/>
+          <a:chOff x="0" y="0"/>
+          <a:chExt cx="0" cy="0"/>
+        </a:xfrm>
+      </p:grpSpPr>
+      <p:sp>
+        <p:nvSpPr>
+          <p:cNvPr id="2" name="標題 1">
+            <a:extLst>
+              <a:ext uri="{FF2B5EF4-FFF2-40B4-BE49-F238E27FC236}">
+                <a16:creationId xmlns:a16="http://schemas.microsoft.com/office/drawing/2014/main" id="{D600DE9A-7953-46B6-A3C9-52948956D850}"/>
+              </a:ext>
+            </a:extLst>
+          </p:cNvPr>
+          <p:cNvSpPr>
+            <a:spLocks noGrp="1"/>
+          </p:cNvSpPr>
+          <p:nvPr>
+            <p:ph type="title"/>
+          </p:nvPr>
+        </p:nvSpPr>
+        <p:spPr/>
+        <p:txBody>
+          <a:bodyPr/>
+          <a:lstStyle/>
+          <a:p>
+            <a:r>
+              <a:rPr lang="en-US" altLang="zh-TW" dirty="0"/>
+              <a:t>Testbench</a:t>
+            </a:r>
+            <a:endParaRPr lang="zh-TW" altLang="en-US" dirty="0"/>
+          </a:p>
+        </p:txBody>
+      </p:sp>
+      <p:sp>
+        <p:nvSpPr>
+          <p:cNvPr id="3" name="內容版面配置區 2">
+            <a:extLst>
+              <a:ext uri="{FF2B5EF4-FFF2-40B4-BE49-F238E27FC236}">
+                <a16:creationId xmlns:a16="http://schemas.microsoft.com/office/drawing/2014/main" id="{8353C71B-AEB7-46FD-B534-547BF855BE52}"/>
+              </a:ext>
+            </a:extLst>
+          </p:cNvPr>
+          <p:cNvSpPr>
+            <a:spLocks noGrp="1"/>
+          </p:cNvSpPr>
+          <p:nvPr>
+            <p:ph idx="1"/>
+          </p:nvPr>
+        </p:nvSpPr>
+        <p:spPr/>
+        <p:txBody>
+          <a:bodyPr/>
+          <a:lstStyle/>
+          <a:p>
+            <a:endParaRPr lang="zh-TW" altLang="en-US"/>
+          </a:p>
+        </p:txBody>
+      </p:sp>
+      <p:sp>
+        <p:nvSpPr>
+          <p:cNvPr id="4" name="日期版面配置區 3">
+            <a:extLst>
+              <a:ext uri="{FF2B5EF4-FFF2-40B4-BE49-F238E27FC236}">
+                <a16:creationId xmlns:a16="http://schemas.microsoft.com/office/drawing/2014/main" id="{339EE32C-A358-43AA-8B13-F5CD6B68FEA9}"/>
+              </a:ext>
+            </a:extLst>
+          </p:cNvPr>
+          <p:cNvSpPr>
+            <a:spLocks noGrp="1"/>
+          </p:cNvSpPr>
+          <p:nvPr>
+            <p:ph type="dt" sz="half" idx="10"/>
+          </p:nvPr>
+        </p:nvSpPr>
+        <p:spPr/>
+        <p:txBody>
+          <a:bodyPr/>
+          <a:lstStyle/>
+          <a:p>
+            <a:fld id="{D12744AA-2124-42E6-AA52-9077A6A76493}" type="datetime1">
+              <a:rPr lang="zh-TW" altLang="en-US" smtClean="0"/>
+              <a:t>2025/4/21</a:t>
+            </a:fld>
+            <a:endParaRPr lang="zh-TW" altLang="en-US"/>
+          </a:p>
+        </p:txBody>
+      </p:sp>
+      <p:sp>
+        <p:nvSpPr>
+          <p:cNvPr id="5" name="投影片編號版面配置區 4">
+            <a:extLst>
+              <a:ext uri="{FF2B5EF4-FFF2-40B4-BE49-F238E27FC236}">
+                <a16:creationId xmlns:a16="http://schemas.microsoft.com/office/drawing/2014/main" id="{AB63288B-F13A-4BC2-A924-0FCDE811BEE3}"/>
+              </a:ext>
+            </a:extLst>
+          </p:cNvPr>
+          <p:cNvSpPr>
+            <a:spLocks noGrp="1"/>
+          </p:cNvSpPr>
+          <p:nvPr>
+            <p:ph type="sldNum" sz="quarter" idx="12"/>
+          </p:nvPr>
+        </p:nvSpPr>
+        <p:spPr/>
+        <p:txBody>
+          <a:bodyPr/>
+          <a:lstStyle/>
+          <a:p>
+            <a:fld id="{13D67497-B2F6-4681-B86D-28F94DA14DA8}" type="slidenum">
+              <a:rPr lang="zh-TW" altLang="en-US" smtClean="0"/>
+              <a:t>21</a:t>
+            </a:fld>
+            <a:endParaRPr lang="zh-TW" altLang="en-US"/>
+          </a:p>
+        </p:txBody>
+      </p:sp>
+      <p:pic>
+        <p:nvPicPr>
+          <p:cNvPr id="8" name="圖片 7">
+            <a:extLst>
+              <a:ext uri="{FF2B5EF4-FFF2-40B4-BE49-F238E27FC236}">
+                <a16:creationId xmlns:a16="http://schemas.microsoft.com/office/drawing/2014/main" id="{70CD474B-5FCA-49BE-BF2A-76AE82CB47A2}"/>
+              </a:ext>
+            </a:extLst>
+          </p:cNvPr>
+          <p:cNvPicPr>
+            <a:picLocks noChangeAspect="1"/>
+          </p:cNvPicPr>
+          <p:nvPr/>
+        </p:nvPicPr>
+        <p:blipFill>
+          <a:blip r:embed="rId2"/>
+          <a:stretch>
+            <a:fillRect/>
+          </a:stretch>
+        </p:blipFill>
+        <p:spPr>
+          <a:xfrm>
+            <a:off x="480725" y="1600481"/>
+            <a:ext cx="11230550" cy="4666176"/>
+          </a:xfrm>
+          <a:prstGeom prst="rect">
+            <a:avLst/>
+          </a:prstGeom>
+        </p:spPr>
+      </p:pic>
+    </p:spTree>
+    <p:extLst>
+      <p:ext uri="{BB962C8B-B14F-4D97-AF65-F5344CB8AC3E}">
+        <p14:creationId xmlns:p14="http://schemas.microsoft.com/office/powerpoint/2010/main" val="2583761628"/>
+      </p:ext>
+    </p:extLst>
+  </p:cSld>
+  <p:clrMapOvr>
+    <a:masterClrMapping/>
+  </p:clrMapOvr>
+</p:sld>
+</file>
+
+<file path=ppt/slides/slide22.xml><?xml version="1.0" encoding="utf-8"?>
+<p:sld xmlns:a="http://schemas.openxmlformats.org/drawingml/2006/main" xmlns:r="http://schemas.openxmlformats.org/officeDocument/2006/relationships" xmlns:p="http://schemas.openxmlformats.org/presentationml/2006/main">
+  <p:cSld>
+    <p:spTree>
+      <p:nvGrpSpPr>
+        <p:cNvPr id="1" name=""/>
+        <p:cNvGrpSpPr/>
+        <p:nvPr/>
+      </p:nvGrpSpPr>
+      <p:grpSpPr>
+        <a:xfrm>
+          <a:off x="0" y="0"/>
+          <a:ext cx="0" cy="0"/>
+          <a:chOff x="0" y="0"/>
+          <a:chExt cx="0" cy="0"/>
+        </a:xfrm>
+      </p:grpSpPr>
+      <p:sp>
+        <p:nvSpPr>
+          <p:cNvPr id="2" name="標題 1">
+            <a:extLst>
+              <a:ext uri="{FF2B5EF4-FFF2-40B4-BE49-F238E27FC236}">
+                <a16:creationId xmlns:a16="http://schemas.microsoft.com/office/drawing/2014/main" id="{D600DE9A-7953-46B6-A3C9-52948956D850}"/>
+              </a:ext>
+            </a:extLst>
+          </p:cNvPr>
+          <p:cNvSpPr>
+            <a:spLocks noGrp="1"/>
+          </p:cNvSpPr>
+          <p:nvPr>
+            <p:ph type="title"/>
+          </p:nvPr>
+        </p:nvSpPr>
+        <p:spPr/>
+        <p:txBody>
+          <a:bodyPr/>
+          <a:lstStyle/>
+          <a:p>
+            <a:r>
+              <a:rPr lang="en-US" altLang="zh-TW" dirty="0"/>
+              <a:t>Simulation Result</a:t>
+            </a:r>
+            <a:endParaRPr lang="zh-TW" altLang="en-US" dirty="0"/>
+          </a:p>
+        </p:txBody>
+      </p:sp>
+      <p:sp>
+        <p:nvSpPr>
+          <p:cNvPr id="3" name="內容版面配置區 2">
+            <a:extLst>
+              <a:ext uri="{FF2B5EF4-FFF2-40B4-BE49-F238E27FC236}">
+                <a16:creationId xmlns:a16="http://schemas.microsoft.com/office/drawing/2014/main" id="{8353C71B-AEB7-46FD-B534-547BF855BE52}"/>
+              </a:ext>
+            </a:extLst>
+          </p:cNvPr>
+          <p:cNvSpPr>
+            <a:spLocks noGrp="1"/>
+          </p:cNvSpPr>
+          <p:nvPr>
+            <p:ph idx="1"/>
+          </p:nvPr>
+        </p:nvSpPr>
+        <p:spPr/>
+        <p:txBody>
+          <a:bodyPr/>
+          <a:lstStyle/>
+          <a:p>
+            <a:r>
+              <a:rPr lang="en-US" altLang="zh-TW" dirty="0"/>
+              <a:t>Testbench simulation pass (no screenshot due to current issues on the workstation. )</a:t>
+            </a:r>
+            <a:endParaRPr lang="zh-TW" altLang="en-US" dirty="0"/>
+          </a:p>
+        </p:txBody>
+      </p:sp>
+      <p:sp>
+        <p:nvSpPr>
+          <p:cNvPr id="4" name="日期版面配置區 3">
+            <a:extLst>
+              <a:ext uri="{FF2B5EF4-FFF2-40B4-BE49-F238E27FC236}">
+                <a16:creationId xmlns:a16="http://schemas.microsoft.com/office/drawing/2014/main" id="{339EE32C-A358-43AA-8B13-F5CD6B68FEA9}"/>
+              </a:ext>
+            </a:extLst>
+          </p:cNvPr>
+          <p:cNvSpPr>
+            <a:spLocks noGrp="1"/>
+          </p:cNvSpPr>
+          <p:nvPr>
+            <p:ph type="dt" sz="half" idx="10"/>
+          </p:nvPr>
+        </p:nvSpPr>
+        <p:spPr/>
+        <p:txBody>
+          <a:bodyPr/>
+          <a:lstStyle/>
+          <a:p>
+            <a:fld id="{D12744AA-2124-42E6-AA52-9077A6A76493}" type="datetime1">
+              <a:rPr lang="zh-TW" altLang="en-US" smtClean="0"/>
+              <a:t>2025/4/21</a:t>
+            </a:fld>
+            <a:endParaRPr lang="zh-TW" altLang="en-US"/>
+          </a:p>
+        </p:txBody>
+      </p:sp>
+      <p:sp>
+        <p:nvSpPr>
+          <p:cNvPr id="5" name="投影片編號版面配置區 4">
+            <a:extLst>
+              <a:ext uri="{FF2B5EF4-FFF2-40B4-BE49-F238E27FC236}">
+                <a16:creationId xmlns:a16="http://schemas.microsoft.com/office/drawing/2014/main" id="{AB63288B-F13A-4BC2-A924-0FCDE811BEE3}"/>
+              </a:ext>
+            </a:extLst>
+          </p:cNvPr>
+          <p:cNvSpPr>
+            <a:spLocks noGrp="1"/>
+          </p:cNvSpPr>
+          <p:nvPr>
+            <p:ph type="sldNum" sz="quarter" idx="12"/>
+          </p:nvPr>
+        </p:nvSpPr>
+        <p:spPr/>
+        <p:txBody>
+          <a:bodyPr/>
+          <a:lstStyle/>
+          <a:p>
+            <a:fld id="{13D67497-B2F6-4681-B86D-28F94DA14DA8}" type="slidenum">
+              <a:rPr lang="zh-TW" altLang="en-US" smtClean="0"/>
+              <a:t>22</a:t>
+            </a:fld>
+            <a:endParaRPr lang="zh-TW" altLang="en-US"/>
+          </a:p>
+        </p:txBody>
+      </p:sp>
+      <p:pic>
+        <p:nvPicPr>
+          <p:cNvPr id="7" name="圖片 6">
+            <a:extLst>
+              <a:ext uri="{FF2B5EF4-FFF2-40B4-BE49-F238E27FC236}">
+                <a16:creationId xmlns:a16="http://schemas.microsoft.com/office/drawing/2014/main" id="{F3ACDD8B-F93F-4E21-A32B-C77000FA1D39}"/>
+              </a:ext>
+            </a:extLst>
+          </p:cNvPr>
+          <p:cNvPicPr>
+            <a:picLocks noChangeAspect="1"/>
+          </p:cNvPicPr>
+          <p:nvPr/>
+        </p:nvPicPr>
+        <p:blipFill>
+          <a:blip r:embed="rId2"/>
+          <a:stretch>
+            <a:fillRect/>
+          </a:stretch>
+        </p:blipFill>
+        <p:spPr>
+          <a:xfrm>
+            <a:off x="1049074" y="3481284"/>
+            <a:ext cx="7057788" cy="1775141"/>
+          </a:xfrm>
+          <a:prstGeom prst="rect">
+            <a:avLst/>
+          </a:prstGeom>
+        </p:spPr>
+      </p:pic>
+    </p:spTree>
+    <p:extLst>
+      <p:ext uri="{BB962C8B-B14F-4D97-AF65-F5344CB8AC3E}">
+        <p14:creationId xmlns:p14="http://schemas.microsoft.com/office/powerpoint/2010/main" val="1814606429"/>
       </p:ext>
     </p:extLst>
   </p:cSld>
@@ -8475,21 +10056,6 @@
               <a:t>2. Synergy with hardware (a single MAC unit)</a:t>
             </a:r>
           </a:p>
-          <a:p>
-            <a:r>
-              <a:rPr lang="en-US" altLang="zh-TW" dirty="0"/>
-              <a:t>3. Memory</a:t>
-            </a:r>
-            <a:r>
-              <a:rPr lang="zh-TW" altLang="en-US" dirty="0"/>
-              <a:t> </a:t>
-            </a:r>
-            <a:r>
-              <a:rPr lang="en-US" altLang="zh-TW" dirty="0"/>
-              <a:t>efficiency</a:t>
-            </a:r>
-            <a:endParaRPr lang="zh-TW" altLang="en-US" dirty="0"/>
-          </a:p>
         </p:txBody>
       </p:sp>
       <p:sp>
@@ -8515,7 +10081,7 @@
           <a:p>
             <a:fld id="{D12744AA-2124-42E6-AA52-9077A6A76493}" type="datetime1">
               <a:rPr lang="zh-TW" altLang="en-US" smtClean="0"/>
-              <a:t>2025/4/19</a:t>
+              <a:t>2025/4/21</a:t>
             </a:fld>
             <a:endParaRPr lang="zh-TW" altLang="en-US"/>
           </a:p>
@@ -8609,8 +10175,8 @@
           </a:p>
         </p:txBody>
       </p:sp>
-      <mc:AlternateContent xmlns:mc="http://schemas.openxmlformats.org/markup-compatibility/2006">
-        <mc:Choice xmlns:a14="http://schemas.microsoft.com/office/drawing/2010/main" Requires="a14">
+      <mc:AlternateContent xmlns:mc="http://schemas.openxmlformats.org/markup-compatibility/2006" xmlns:a14="http://schemas.microsoft.com/office/drawing/2010/main">
+        <mc:Choice Requires="a14">
           <p:sp>
             <p:nvSpPr>
               <p:cNvPr id="3" name="內容版面配置區 2">
@@ -8737,7 +10303,7 @@
             </p:txBody>
           </p:sp>
         </mc:Choice>
-        <mc:Fallback>
+        <mc:Fallback xmlns="">
           <p:sp>
             <p:nvSpPr>
               <p:cNvPr id="3" name="內容版面配置區 2">
@@ -8800,7 +10366,7 @@
           <a:p>
             <a:fld id="{D12744AA-2124-42E6-AA52-9077A6A76493}" type="datetime1">
               <a:rPr lang="zh-TW" altLang="en-US" smtClean="0"/>
-              <a:t>2025/4/20</a:t>
+              <a:t>2025/4/21</a:t>
             </a:fld>
             <a:endParaRPr lang="zh-TW" altLang="en-US"/>
           </a:p>
@@ -8835,8 +10401,8 @@
           </a:p>
         </p:txBody>
       </p:sp>
-      <mc:AlternateContent xmlns:mc="http://schemas.openxmlformats.org/markup-compatibility/2006">
-        <mc:Choice xmlns:a14="http://schemas.microsoft.com/office/drawing/2010/main" Requires="a14">
+      <mc:AlternateContent xmlns:mc="http://schemas.openxmlformats.org/markup-compatibility/2006" xmlns:a14="http://schemas.microsoft.com/office/drawing/2010/main">
+        <mc:Choice Requires="a14">
           <p:sp>
             <p:nvSpPr>
               <p:cNvPr id="6" name="文字方塊 5">
@@ -8865,6 +10431,7 @@
               </a:bodyPr>
               <a:lstStyle/>
               <a:p>
+                <a:pPr/>
                 <a14:m>
                   <m:oMathPara xmlns:m="http://schemas.openxmlformats.org/officeDocument/2006/math">
                     <m:oMathParaPr>
@@ -8947,7 +10514,7 @@
             </p:txBody>
           </p:sp>
         </mc:Choice>
-        <mc:Fallback>
+        <mc:Fallback xmlns="">
           <p:sp>
             <p:nvSpPr>
               <p:cNvPr id="6" name="文字方塊 5">
@@ -8992,8 +10559,8 @@
           </p:sp>
         </mc:Fallback>
       </mc:AlternateContent>
-      <mc:AlternateContent xmlns:mc="http://schemas.openxmlformats.org/markup-compatibility/2006">
-        <mc:Choice xmlns:a14="http://schemas.microsoft.com/office/drawing/2010/main" Requires="a14">
+      <mc:AlternateContent xmlns:mc="http://schemas.openxmlformats.org/markup-compatibility/2006" xmlns:a14="http://schemas.microsoft.com/office/drawing/2010/main">
+        <mc:Choice Requires="a14">
           <p:sp>
             <p:nvSpPr>
               <p:cNvPr id="7" name="文字方塊 6">
@@ -9196,7 +10763,7 @@
             </p:txBody>
           </p:sp>
         </mc:Choice>
-        <mc:Fallback>
+        <mc:Fallback xmlns="">
           <p:sp>
             <p:nvSpPr>
               <p:cNvPr id="7" name="文字方塊 6">
@@ -9354,7 +10921,7 @@
           <a:p>
             <a:fld id="{D12744AA-2124-42E6-AA52-9077A6A76493}" type="datetime1">
               <a:rPr lang="zh-TW" altLang="en-US" smtClean="0"/>
-              <a:t>2025/4/20</a:t>
+              <a:t>2025/4/21</a:t>
             </a:fld>
             <a:endParaRPr lang="zh-TW" altLang="en-US"/>
           </a:p>
@@ -9389,8 +10956,8 @@
           </a:p>
         </p:txBody>
       </p:sp>
-      <mc:AlternateContent xmlns:mc="http://schemas.openxmlformats.org/markup-compatibility/2006">
-        <mc:Choice xmlns:a14="http://schemas.microsoft.com/office/drawing/2010/main" Requires="a14">
+      <mc:AlternateContent xmlns:mc="http://schemas.openxmlformats.org/markup-compatibility/2006" xmlns:a14="http://schemas.microsoft.com/office/drawing/2010/main">
+        <mc:Choice Requires="a14">
           <p:sp>
             <p:nvSpPr>
               <p:cNvPr id="7" name="文字方塊 6">
@@ -9419,6 +10986,7 @@
               </a:bodyPr>
               <a:lstStyle/>
               <a:p>
+                <a:pPr/>
                 <a14:m>
                   <m:oMathPara xmlns:m="http://schemas.openxmlformats.org/officeDocument/2006/math">
                     <m:oMathParaPr>
@@ -9509,7 +11077,7 @@
             </p:txBody>
           </p:sp>
         </mc:Choice>
-        <mc:Fallback>
+        <mc:Fallback xmlns="">
           <p:sp>
             <p:nvSpPr>
               <p:cNvPr id="7" name="文字方塊 6">
@@ -9613,8 +11181,8 @@
           </a:p>
         </p:txBody>
       </p:sp>
-      <mc:AlternateContent xmlns:mc="http://schemas.openxmlformats.org/markup-compatibility/2006">
-        <mc:Choice xmlns:a14="http://schemas.microsoft.com/office/drawing/2010/main" Requires="a14">
+      <mc:AlternateContent xmlns:mc="http://schemas.openxmlformats.org/markup-compatibility/2006" xmlns:a14="http://schemas.microsoft.com/office/drawing/2010/main">
+        <mc:Choice Requires="a14">
           <p:sp>
             <p:nvSpPr>
               <p:cNvPr id="3" name="內容版面配置區 2">
@@ -9901,13 +11469,7 @@
                       <a:rPr lang="en-US" altLang="zh-TW" sz="2800" b="0" i="1" smtClean="0">
                         <a:latin typeface="Cambria Math" panose="02040503050406030204" pitchFamily="18" charset="0"/>
                       </a:rPr>
-                      <m:t>|)</m:t>
-                    </m:r>
-                    <m:r>
-                      <a:rPr lang="en-US" altLang="zh-TW" sz="2800" b="0" i="1" smtClean="0">
-                        <a:latin typeface="Cambria Math" panose="02040503050406030204" pitchFamily="18" charset="0"/>
-                      </a:rPr>
-                      <m:t>, </m:t>
+                      <m:t>|), </m:t>
                     </m:r>
                     <m:r>
                       <a:rPr lang="en-US" altLang="zh-TW" sz="2800" b="0" i="1" smtClean="0">
@@ -9943,7 +11505,7 @@
             </p:txBody>
           </p:sp>
         </mc:Choice>
-        <mc:Fallback>
+        <mc:Fallback xmlns="">
           <p:sp>
             <p:nvSpPr>
               <p:cNvPr id="3" name="內容版面配置區 2">
@@ -10006,7 +11568,7 @@
           <a:p>
             <a:fld id="{D12744AA-2124-42E6-AA52-9077A6A76493}" type="datetime1">
               <a:rPr lang="zh-TW" altLang="en-US" smtClean="0"/>
-              <a:t>2025/4/20</a:t>
+              <a:t>2025/4/21</a:t>
             </a:fld>
             <a:endParaRPr lang="zh-TW" altLang="en-US"/>
           </a:p>
@@ -10100,8 +11662,8 @@
           </a:p>
         </p:txBody>
       </p:sp>
-      <mc:AlternateContent xmlns:mc="http://schemas.openxmlformats.org/markup-compatibility/2006">
-        <mc:Choice xmlns:a14="http://schemas.microsoft.com/office/drawing/2010/main" Requires="a14">
+      <mc:AlternateContent xmlns:mc="http://schemas.openxmlformats.org/markup-compatibility/2006" xmlns:a14="http://schemas.microsoft.com/office/drawing/2010/main">
+        <mc:Choice Requires="a14">
           <p:sp>
             <p:nvSpPr>
               <p:cNvPr id="3" name="內容版面配置區 2">
@@ -10482,7 +12044,7 @@
             </p:txBody>
           </p:sp>
         </mc:Choice>
-        <mc:Fallback>
+        <mc:Fallback xmlns="">
           <p:sp>
             <p:nvSpPr>
               <p:cNvPr id="3" name="內容版面配置區 2">
@@ -10549,7 +12111,7 @@
           <a:p>
             <a:fld id="{D12744AA-2124-42E6-AA52-9077A6A76493}" type="datetime1">
               <a:rPr lang="zh-TW" altLang="en-US" smtClean="0"/>
-              <a:t>2025/4/20</a:t>
+              <a:t>2025/4/21</a:t>
             </a:fld>
             <a:endParaRPr lang="zh-TW" altLang="en-US"/>
           </a:p>
@@ -10584,8 +12146,8 @@
           </a:p>
         </p:txBody>
       </p:sp>
-      <mc:AlternateContent xmlns:mc="http://schemas.openxmlformats.org/markup-compatibility/2006">
-        <mc:Choice xmlns:a14="http://schemas.microsoft.com/office/drawing/2010/main" Requires="a14">
+      <mc:AlternateContent xmlns:mc="http://schemas.openxmlformats.org/markup-compatibility/2006" xmlns:a14="http://schemas.microsoft.com/office/drawing/2010/main">
+        <mc:Choice Requires="a14">
           <p:sp>
             <p:nvSpPr>
               <p:cNvPr id="6" name="內容版面配置區 2">
@@ -10956,7 +12518,7 @@
             </p:txBody>
           </p:sp>
         </mc:Choice>
-        <mc:Fallback>
+        <mc:Fallback xmlns="">
           <p:sp>
             <p:nvSpPr>
               <p:cNvPr id="6" name="內容版面配置區 2">
@@ -11001,8 +12563,8 @@
           </p:sp>
         </mc:Fallback>
       </mc:AlternateContent>
-      <mc:AlternateContent xmlns:mc="http://schemas.openxmlformats.org/markup-compatibility/2006">
-        <mc:Choice xmlns:a14="http://schemas.microsoft.com/office/drawing/2010/main" Requires="a14">
+      <mc:AlternateContent xmlns:mc="http://schemas.openxmlformats.org/markup-compatibility/2006" xmlns:a14="http://schemas.microsoft.com/office/drawing/2010/main">
+        <mc:Choice Requires="a14">
           <p:sp>
             <p:nvSpPr>
               <p:cNvPr id="9" name="文字方塊 8">
@@ -11031,7 +12593,6 @@
               </a:bodyPr>
               <a:lstStyle/>
               <a:p>
-                <a:pPr/>
                 <a:r>
                   <a:rPr lang="en-US" altLang="zh-TW" sz="2800" dirty="0">
                     <a:latin typeface="Times New Roman" panose="02020603050405020304" pitchFamily="18" charset="0"/>
@@ -11072,7 +12633,7 @@
             </p:txBody>
           </p:sp>
         </mc:Choice>
-        <mc:Fallback>
+        <mc:Fallback xmlns="">
           <p:sp>
             <p:nvSpPr>
               <p:cNvPr id="9" name="文字方塊 8">
@@ -11199,7 +12760,7 @@
           <a:p>
             <a:fld id="{D12744AA-2124-42E6-AA52-9077A6A76493}" type="datetime1">
               <a:rPr lang="zh-TW" altLang="en-US" smtClean="0"/>
-              <a:t>2025/4/20</a:t>
+              <a:t>2025/4/21</a:t>
             </a:fld>
             <a:endParaRPr lang="zh-TW" altLang="en-US"/>
           </a:p>
@@ -11399,7 +12960,7 @@
               <a:p>
                 <a:r>
                   <a:rPr lang="en-US" altLang="zh-TW" dirty="0"/>
-                  <a:t>But storing floating point 0.01 for every vector is inefficient.</a:t>
+                  <a:t>But storing floating point (e.g. 0.01) for every vector is inefficient.</a:t>
                 </a:r>
               </a:p>
               <a:p>
@@ -11584,7 +13145,7 @@
           <a:p>
             <a:fld id="{D12744AA-2124-42E6-AA52-9077A6A76493}" type="datetime1">
               <a:rPr lang="zh-TW" altLang="en-US" smtClean="0"/>
-              <a:t>2025/4/20</a:t>
+              <a:t>2025/4/21</a:t>
             </a:fld>
             <a:endParaRPr lang="zh-TW" altLang="en-US"/>
           </a:p>
@@ -11619,8 +13180,8 @@
           </a:p>
         </p:txBody>
       </p:sp>
-      <mc:AlternateContent xmlns:mc="http://schemas.openxmlformats.org/markup-compatibility/2006">
-        <mc:Choice xmlns:a14="http://schemas.microsoft.com/office/drawing/2010/main" Requires="a14">
+      <mc:AlternateContent xmlns:mc="http://schemas.openxmlformats.org/markup-compatibility/2006" xmlns:a14="http://schemas.microsoft.com/office/drawing/2010/main">
+        <mc:Choice Requires="a14">
           <p:sp>
             <p:nvSpPr>
               <p:cNvPr id="10" name="內容版面配置區 2">
@@ -11720,7 +13281,7 @@
             </p:txBody>
           </p:sp>
         </mc:Choice>
-        <mc:Fallback>
+        <mc:Fallback xmlns="">
           <p:sp>
             <p:nvSpPr>
               <p:cNvPr id="10" name="內容版面配置區 2">
@@ -11764,8 +13325,8 @@
           </p:sp>
         </mc:Fallback>
       </mc:AlternateContent>
-      <mc:AlternateContent xmlns:mc="http://schemas.openxmlformats.org/markup-compatibility/2006">
-        <mc:Choice xmlns:a14="http://schemas.microsoft.com/office/drawing/2010/main" Requires="a14">
+      <mc:AlternateContent xmlns:mc="http://schemas.openxmlformats.org/markup-compatibility/2006" xmlns:a14="http://schemas.microsoft.com/office/drawing/2010/main">
+        <mc:Choice Requires="a14">
           <p:sp>
             <p:nvSpPr>
               <p:cNvPr id="12" name="文字方塊 11">
@@ -11794,6 +13355,7 @@
               </a:bodyPr>
               <a:lstStyle/>
               <a:p>
+                <a:pPr/>
                 <a14:m>
                   <m:oMathPara xmlns:m="http://schemas.openxmlformats.org/officeDocument/2006/math">
                     <m:oMathParaPr>
@@ -11915,7 +13477,7 @@
             </p:txBody>
           </p:sp>
         </mc:Choice>
-        <mc:Fallback>
+        <mc:Fallback xmlns="">
           <p:sp>
             <p:nvSpPr>
               <p:cNvPr id="12" name="文字方塊 11">

</xml_diff>